<commit_message>
Updated OKC Python PowerPoint
</commit_message>
<xml_diff>
--- a/2018-01-10 OKC Python.pptx
+++ b/2018-01-10 OKC Python.pptx
@@ -28,14 +28,14 @@
   <p:notesSz cx="6858000" cy="9144000"/>
   <p:embeddedFontLst>
     <p:embeddedFont>
-      <p:font typeface="Playfair Display" panose="020B0604020202020204" charset="0"/>
+      <p:font typeface="Lato" panose="020B0604020202020204" charset="0"/>
       <p:regular r:id="rId18"/>
       <p:bold r:id="rId19"/>
       <p:italic r:id="rId20"/>
       <p:boldItalic r:id="rId21"/>
     </p:embeddedFont>
     <p:embeddedFont>
-      <p:font typeface="Lato" panose="020B0604020202020204" charset="0"/>
+      <p:font typeface="Playfair Display" panose="020B0604020202020204" charset="0"/>
       <p:regular r:id="rId22"/>
       <p:bold r:id="rId23"/>
       <p:italic r:id="rId24"/>
@@ -346,74 +346,101 @@
         <p:txBody>
           <a:bodyPr wrap="square" lIns="91425" tIns="91425" rIns="91425" bIns="91425" anchor="t" anchorCtr="0"/>
           <a:lstStyle>
-            <a:lvl1pPr lvl="0">
-              <a:spcBef>
-                <a:spcPts val="0"/>
-              </a:spcBef>
+            <a:lvl1pPr marL="457200" lvl="0" indent="-298450">
+              <a:spcBef>
+                <a:spcPts val="0"/>
+              </a:spcBef>
+              <a:spcAft>
+                <a:spcPts val="0"/>
+              </a:spcAft>
               <a:buSzPts val="1100"/>
               <a:buChar char="●"/>
               <a:defRPr sz="1100"/>
             </a:lvl1pPr>
-            <a:lvl2pPr lvl="1">
-              <a:spcBef>
-                <a:spcPts val="0"/>
-              </a:spcBef>
+            <a:lvl2pPr marL="914400" lvl="1" indent="-298450">
+              <a:spcBef>
+                <a:spcPts val="0"/>
+              </a:spcBef>
+              <a:spcAft>
+                <a:spcPts val="0"/>
+              </a:spcAft>
               <a:buSzPts val="1100"/>
               <a:buChar char="○"/>
               <a:defRPr sz="1100"/>
             </a:lvl2pPr>
-            <a:lvl3pPr lvl="2">
-              <a:spcBef>
-                <a:spcPts val="0"/>
-              </a:spcBef>
+            <a:lvl3pPr marL="1371600" lvl="2" indent="-298450">
+              <a:spcBef>
+                <a:spcPts val="0"/>
+              </a:spcBef>
+              <a:spcAft>
+                <a:spcPts val="0"/>
+              </a:spcAft>
               <a:buSzPts val="1100"/>
               <a:buChar char="■"/>
               <a:defRPr sz="1100"/>
             </a:lvl3pPr>
-            <a:lvl4pPr lvl="3">
-              <a:spcBef>
-                <a:spcPts val="0"/>
-              </a:spcBef>
+            <a:lvl4pPr marL="1828800" lvl="3" indent="-298450">
+              <a:spcBef>
+                <a:spcPts val="0"/>
+              </a:spcBef>
+              <a:spcAft>
+                <a:spcPts val="0"/>
+              </a:spcAft>
               <a:buSzPts val="1100"/>
               <a:buChar char="●"/>
               <a:defRPr sz="1100"/>
             </a:lvl4pPr>
-            <a:lvl5pPr lvl="4">
-              <a:spcBef>
-                <a:spcPts val="0"/>
-              </a:spcBef>
+            <a:lvl5pPr marL="2286000" lvl="4" indent="-298450">
+              <a:spcBef>
+                <a:spcPts val="0"/>
+              </a:spcBef>
+              <a:spcAft>
+                <a:spcPts val="0"/>
+              </a:spcAft>
               <a:buSzPts val="1100"/>
               <a:buChar char="○"/>
               <a:defRPr sz="1100"/>
             </a:lvl5pPr>
-            <a:lvl6pPr lvl="5">
-              <a:spcBef>
-                <a:spcPts val="0"/>
-              </a:spcBef>
+            <a:lvl6pPr marL="2743200" lvl="5" indent="-298450">
+              <a:spcBef>
+                <a:spcPts val="0"/>
+              </a:spcBef>
+              <a:spcAft>
+                <a:spcPts val="0"/>
+              </a:spcAft>
               <a:buSzPts val="1100"/>
               <a:buChar char="■"/>
               <a:defRPr sz="1100"/>
             </a:lvl6pPr>
-            <a:lvl7pPr lvl="6">
-              <a:spcBef>
-                <a:spcPts val="0"/>
-              </a:spcBef>
+            <a:lvl7pPr marL="3200400" lvl="6" indent="-298450">
+              <a:spcBef>
+                <a:spcPts val="0"/>
+              </a:spcBef>
+              <a:spcAft>
+                <a:spcPts val="0"/>
+              </a:spcAft>
               <a:buSzPts val="1100"/>
               <a:buChar char="●"/>
               <a:defRPr sz="1100"/>
             </a:lvl7pPr>
-            <a:lvl8pPr lvl="7">
-              <a:spcBef>
-                <a:spcPts val="0"/>
-              </a:spcBef>
+            <a:lvl8pPr marL="3657600" lvl="7" indent="-298450">
+              <a:spcBef>
+                <a:spcPts val="0"/>
+              </a:spcBef>
+              <a:spcAft>
+                <a:spcPts val="0"/>
+              </a:spcAft>
               <a:buSzPts val="1100"/>
               <a:buChar char="○"/>
               <a:defRPr sz="1100"/>
             </a:lvl8pPr>
-            <a:lvl9pPr lvl="8">
-              <a:spcBef>
-                <a:spcPts val="0"/>
-              </a:spcBef>
+            <a:lvl9pPr marL="4114800" lvl="8" indent="-298450">
+              <a:spcBef>
+                <a:spcPts val="0"/>
+              </a:spcBef>
+              <a:spcAft>
+                <a:spcPts val="0"/>
+              </a:spcAft>
               <a:buSzPts val="1100"/>
               <a:buChar char="■"/>
               <a:defRPr sz="1100"/>
@@ -427,7 +454,7 @@
     </p:spTree>
     <p:extLst>
       <p:ext uri="{BB962C8B-B14F-4D97-AF65-F5344CB8AC3E}">
-        <p14:creationId xmlns:p14="http://schemas.microsoft.com/office/powerpoint/2010/main" val="1178313690"/>
+        <p14:creationId xmlns:p14="http://schemas.microsoft.com/office/powerpoint/2010/main" val="1877598314"/>
       </p:ext>
     </p:extLst>
   </p:cSld>
@@ -614,6 +641,9 @@
               <a:spcBef>
                 <a:spcPts val="0"/>
               </a:spcBef>
+              <a:spcAft>
+                <a:spcPts val="0"/>
+              </a:spcAft>
               <a:buNone/>
             </a:pPr>
             <a:endParaRPr/>
@@ -715,6 +745,9 @@
               <a:spcBef>
                 <a:spcPts val="0"/>
               </a:spcBef>
+              <a:spcAft>
+                <a:spcPts val="0"/>
+              </a:spcAft>
               <a:buNone/>
             </a:pPr>
             <a:endParaRPr/>
@@ -816,6 +849,9 @@
               <a:spcBef>
                 <a:spcPts val="0"/>
               </a:spcBef>
+              <a:spcAft>
+                <a:spcPts val="0"/>
+              </a:spcAft>
               <a:buNone/>
             </a:pPr>
             <a:endParaRPr/>
@@ -917,6 +953,9 @@
               <a:spcBef>
                 <a:spcPts val="0"/>
               </a:spcBef>
+              <a:spcAft>
+                <a:spcPts val="0"/>
+              </a:spcAft>
               <a:buNone/>
             </a:pPr>
             <a:endParaRPr/>
@@ -1018,6 +1057,9 @@
               <a:spcBef>
                 <a:spcPts val="0"/>
               </a:spcBef>
+              <a:spcAft>
+                <a:spcPts val="0"/>
+              </a:spcAft>
               <a:buNone/>
             </a:pPr>
             <a:endParaRPr/>
@@ -1119,6 +1161,9 @@
               <a:spcBef>
                 <a:spcPts val="0"/>
               </a:spcBef>
+              <a:spcAft>
+                <a:spcPts val="0"/>
+              </a:spcAft>
               <a:buNone/>
             </a:pPr>
             <a:endParaRPr/>
@@ -1220,6 +1265,9 @@
               <a:spcBef>
                 <a:spcPts val="0"/>
               </a:spcBef>
+              <a:spcAft>
+                <a:spcPts val="0"/>
+              </a:spcAft>
               <a:buNone/>
             </a:pPr>
             <a:endParaRPr/>
@@ -1321,6 +1369,9 @@
               <a:spcBef>
                 <a:spcPts val="0"/>
               </a:spcBef>
+              <a:spcAft>
+                <a:spcPts val="0"/>
+              </a:spcAft>
               <a:buNone/>
             </a:pPr>
             <a:endParaRPr/>
@@ -1422,6 +1473,9 @@
               <a:spcBef>
                 <a:spcPts val="0"/>
               </a:spcBef>
+              <a:spcAft>
+                <a:spcPts val="0"/>
+              </a:spcAft>
               <a:buNone/>
             </a:pPr>
             <a:endParaRPr/>
@@ -1523,6 +1577,9 @@
               <a:spcBef>
                 <a:spcPts val="0"/>
               </a:spcBef>
+              <a:spcAft>
+                <a:spcPts val="0"/>
+              </a:spcAft>
               <a:buNone/>
             </a:pPr>
             <a:endParaRPr/>
@@ -1624,6 +1681,9 @@
               <a:spcBef>
                 <a:spcPts val="0"/>
               </a:spcBef>
+              <a:spcAft>
+                <a:spcPts val="0"/>
+              </a:spcAft>
               <a:buNone/>
             </a:pPr>
             <a:endParaRPr/>
@@ -1725,6 +1785,9 @@
               <a:spcBef>
                 <a:spcPts val="0"/>
               </a:spcBef>
+              <a:spcAft>
+                <a:spcPts val="0"/>
+              </a:spcAft>
               <a:buNone/>
             </a:pPr>
             <a:endParaRPr/>
@@ -1826,6 +1889,9 @@
               <a:spcBef>
                 <a:spcPts val="0"/>
               </a:spcBef>
+              <a:spcAft>
+                <a:spcPts val="0"/>
+              </a:spcAft>
               <a:buNone/>
             </a:pPr>
             <a:endParaRPr/>
@@ -1927,6 +1993,9 @@
               <a:spcBef>
                 <a:spcPts val="0"/>
               </a:spcBef>
+              <a:spcAft>
+                <a:spcPts val="0"/>
+              </a:spcAft>
               <a:buNone/>
             </a:pPr>
             <a:endParaRPr/>
@@ -2028,6 +2097,9 @@
               <a:spcBef>
                 <a:spcPts val="0"/>
               </a:spcBef>
+              <a:spcAft>
+                <a:spcPts val="0"/>
+              </a:spcAft>
               <a:buNone/>
             </a:pPr>
             <a:endParaRPr/>
@@ -2090,6 +2162,9 @@
               <a:spcBef>
                 <a:spcPts val="0"/>
               </a:spcBef>
+              <a:spcAft>
+                <a:spcPts val="0"/>
+              </a:spcAft>
               <a:buNone/>
             </a:pPr>
             <a:endParaRPr/>
@@ -2127,6 +2202,9 @@
               <a:spcBef>
                 <a:spcPts val="0"/>
               </a:spcBef>
+              <a:spcAft>
+                <a:spcPts val="0"/>
+              </a:spcAft>
               <a:buNone/>
             </a:pPr>
             <a:endParaRPr/>
@@ -2185,6 +2263,9 @@
               <a:spcBef>
                 <a:spcPts val="1000"/>
               </a:spcBef>
+              <a:spcAft>
+                <a:spcPts val="0"/>
+              </a:spcAft>
               <a:buSzPts val="4800"/>
               <a:buNone/>
               <a:defRPr sz="4800"/>
@@ -2193,6 +2274,9 @@
               <a:spcBef>
                 <a:spcPts val="1000"/>
               </a:spcBef>
+              <a:spcAft>
+                <a:spcPts val="0"/>
+              </a:spcAft>
               <a:buSzPts val="4800"/>
               <a:buNone/>
               <a:defRPr sz="4800"/>
@@ -2201,6 +2285,9 @@
               <a:spcBef>
                 <a:spcPts val="1000"/>
               </a:spcBef>
+              <a:spcAft>
+                <a:spcPts val="0"/>
+              </a:spcAft>
               <a:buSzPts val="4800"/>
               <a:buNone/>
               <a:defRPr sz="4800"/>
@@ -2209,6 +2296,9 @@
               <a:spcBef>
                 <a:spcPts val="1000"/>
               </a:spcBef>
+              <a:spcAft>
+                <a:spcPts val="0"/>
+              </a:spcAft>
               <a:buSzPts val="4800"/>
               <a:buNone/>
               <a:defRPr sz="4800"/>
@@ -2217,6 +2307,9 @@
               <a:spcBef>
                 <a:spcPts val="1000"/>
               </a:spcBef>
+              <a:spcAft>
+                <a:spcPts val="0"/>
+              </a:spcAft>
               <a:buSzPts val="4800"/>
               <a:buNone/>
               <a:defRPr sz="4800"/>
@@ -2225,6 +2318,9 @@
               <a:spcBef>
                 <a:spcPts val="1000"/>
               </a:spcBef>
+              <a:spcAft>
+                <a:spcPts val="0"/>
+              </a:spcAft>
               <a:buSzPts val="4800"/>
               <a:buNone/>
               <a:defRPr sz="4800"/>
@@ -2233,6 +2329,9 @@
               <a:spcBef>
                 <a:spcPts val="1000"/>
               </a:spcBef>
+              <a:spcAft>
+                <a:spcPts val="0"/>
+              </a:spcAft>
               <a:buSzPts val="4800"/>
               <a:buNone/>
               <a:defRPr sz="4800"/>
@@ -2241,6 +2340,9 @@
               <a:spcBef>
                 <a:spcPts val="1000"/>
               </a:spcBef>
+              <a:spcAft>
+                <a:spcPts val="0"/>
+              </a:spcAft>
               <a:buSzPts val="4800"/>
               <a:buNone/>
               <a:defRPr sz="4800"/>
@@ -2249,6 +2351,9 @@
               <a:spcBef>
                 <a:spcPts val="1000"/>
               </a:spcBef>
+              <a:spcAft>
+                <a:spcPts val="0"/>
+              </a:spcAft>
               <a:buSzPts val="4800"/>
               <a:buNone/>
               <a:defRPr sz="4800"/>
@@ -2505,13 +2610,16 @@
               <a:spcBef>
                 <a:spcPts val="0"/>
               </a:spcBef>
+              <a:spcAft>
+                <a:spcPts val="0"/>
+              </a:spcAft>
               <a:buNone/>
             </a:pPr>
             <a:fld id="{00000000-1234-1234-1234-123412341234}" type="slidenum">
               <a:rPr lang="en"/>
               <a:t>‹#›</a:t>
             </a:fld>
-            <a:endParaRPr lang="en"/>
+            <a:endParaRPr/>
           </a:p>
         </p:txBody>
       </p:sp>
@@ -2579,6 +2687,9 @@
               <a:spcBef>
                 <a:spcPts val="0"/>
               </a:spcBef>
+              <a:spcAft>
+                <a:spcPts val="0"/>
+              </a:spcAft>
               <a:buNone/>
             </a:pPr>
             <a:endParaRPr/>
@@ -2616,6 +2727,9 @@
               <a:spcBef>
                 <a:spcPts val="0"/>
               </a:spcBef>
+              <a:spcAft>
+                <a:spcPts val="0"/>
+              </a:spcAft>
               <a:buNone/>
             </a:pPr>
             <a:endParaRPr/>
@@ -2648,6 +2762,9 @@
               <a:spcBef>
                 <a:spcPts val="0"/>
               </a:spcBef>
+              <a:spcAft>
+                <a:spcPts val="0"/>
+              </a:spcAft>
               <a:buClr>
                 <a:schemeClr val="accent6"/>
               </a:buClr>
@@ -2663,6 +2780,9 @@
               <a:spcBef>
                 <a:spcPts val="0"/>
               </a:spcBef>
+              <a:spcAft>
+                <a:spcPts val="0"/>
+              </a:spcAft>
               <a:buClr>
                 <a:schemeClr val="accent6"/>
               </a:buClr>
@@ -2678,6 +2798,9 @@
               <a:spcBef>
                 <a:spcPts val="0"/>
               </a:spcBef>
+              <a:spcAft>
+                <a:spcPts val="0"/>
+              </a:spcAft>
               <a:buClr>
                 <a:schemeClr val="accent6"/>
               </a:buClr>
@@ -2693,6 +2816,9 @@
               <a:spcBef>
                 <a:spcPts val="0"/>
               </a:spcBef>
+              <a:spcAft>
+                <a:spcPts val="0"/>
+              </a:spcAft>
               <a:buClr>
                 <a:schemeClr val="accent6"/>
               </a:buClr>
@@ -2708,6 +2834,9 @@
               <a:spcBef>
                 <a:spcPts val="0"/>
               </a:spcBef>
+              <a:spcAft>
+                <a:spcPts val="0"/>
+              </a:spcAft>
               <a:buClr>
                 <a:schemeClr val="accent6"/>
               </a:buClr>
@@ -2723,6 +2852,9 @@
               <a:spcBef>
                 <a:spcPts val="0"/>
               </a:spcBef>
+              <a:spcAft>
+                <a:spcPts val="0"/>
+              </a:spcAft>
               <a:buClr>
                 <a:schemeClr val="accent6"/>
               </a:buClr>
@@ -2738,6 +2870,9 @@
               <a:spcBef>
                 <a:spcPts val="0"/>
               </a:spcBef>
+              <a:spcAft>
+                <a:spcPts val="0"/>
+              </a:spcAft>
               <a:buClr>
                 <a:schemeClr val="accent6"/>
               </a:buClr>
@@ -2753,6 +2888,9 @@
               <a:spcBef>
                 <a:spcPts val="0"/>
               </a:spcBef>
+              <a:spcAft>
+                <a:spcPts val="0"/>
+              </a:spcAft>
               <a:buClr>
                 <a:schemeClr val="accent6"/>
               </a:buClr>
@@ -2768,6 +2906,9 @@
               <a:spcBef>
                 <a:spcPts val="0"/>
               </a:spcBef>
+              <a:spcAft>
+                <a:spcPts val="0"/>
+              </a:spcAft>
               <a:buClr>
                 <a:schemeClr val="accent6"/>
               </a:buClr>
@@ -2807,74 +2948,101 @@
         <p:txBody>
           <a:bodyPr wrap="square" lIns="91425" tIns="91425" rIns="91425" bIns="91425" anchor="t" anchorCtr="0"/>
           <a:lstStyle>
-            <a:lvl1pPr lvl="0" algn="ctr">
-              <a:spcBef>
-                <a:spcPts val="0"/>
-              </a:spcBef>
+            <a:lvl1pPr marL="457200" lvl="0" indent="-342900" algn="ctr">
+              <a:spcBef>
+                <a:spcPts val="0"/>
+              </a:spcBef>
+              <a:spcAft>
+                <a:spcPts val="0"/>
+              </a:spcAft>
               <a:buSzPts val="1800"/>
               <a:buChar char="●"/>
               <a:defRPr/>
             </a:lvl1pPr>
-            <a:lvl2pPr lvl="1" algn="ctr">
-              <a:spcBef>
-                <a:spcPts val="0"/>
-              </a:spcBef>
+            <a:lvl2pPr marL="914400" lvl="1" indent="-317500" algn="ctr">
+              <a:spcBef>
+                <a:spcPts val="1600"/>
+              </a:spcBef>
+              <a:spcAft>
+                <a:spcPts val="0"/>
+              </a:spcAft>
               <a:buSzPts val="1400"/>
               <a:buChar char="○"/>
               <a:defRPr/>
             </a:lvl2pPr>
-            <a:lvl3pPr lvl="2" algn="ctr">
-              <a:spcBef>
-                <a:spcPts val="0"/>
-              </a:spcBef>
+            <a:lvl3pPr marL="1371600" lvl="2" indent="-317500" algn="ctr">
+              <a:spcBef>
+                <a:spcPts val="1600"/>
+              </a:spcBef>
+              <a:spcAft>
+                <a:spcPts val="0"/>
+              </a:spcAft>
               <a:buSzPts val="1400"/>
               <a:buChar char="■"/>
               <a:defRPr/>
             </a:lvl3pPr>
-            <a:lvl4pPr lvl="3" algn="ctr">
-              <a:spcBef>
-                <a:spcPts val="0"/>
-              </a:spcBef>
+            <a:lvl4pPr marL="1828800" lvl="3" indent="-317500" algn="ctr">
+              <a:spcBef>
+                <a:spcPts val="1600"/>
+              </a:spcBef>
+              <a:spcAft>
+                <a:spcPts val="0"/>
+              </a:spcAft>
               <a:buSzPts val="1400"/>
               <a:buChar char="●"/>
               <a:defRPr/>
             </a:lvl4pPr>
-            <a:lvl5pPr lvl="4" algn="ctr">
-              <a:spcBef>
-                <a:spcPts val="0"/>
-              </a:spcBef>
+            <a:lvl5pPr marL="2286000" lvl="4" indent="-317500" algn="ctr">
+              <a:spcBef>
+                <a:spcPts val="1600"/>
+              </a:spcBef>
+              <a:spcAft>
+                <a:spcPts val="0"/>
+              </a:spcAft>
               <a:buSzPts val="1400"/>
               <a:buChar char="○"/>
               <a:defRPr/>
             </a:lvl5pPr>
-            <a:lvl6pPr lvl="5" algn="ctr">
-              <a:spcBef>
-                <a:spcPts val="0"/>
-              </a:spcBef>
+            <a:lvl6pPr marL="2743200" lvl="5" indent="-317500" algn="ctr">
+              <a:spcBef>
+                <a:spcPts val="1600"/>
+              </a:spcBef>
+              <a:spcAft>
+                <a:spcPts val="0"/>
+              </a:spcAft>
               <a:buSzPts val="1400"/>
               <a:buChar char="■"/>
               <a:defRPr/>
             </a:lvl6pPr>
-            <a:lvl7pPr lvl="6" algn="ctr">
-              <a:spcBef>
-                <a:spcPts val="0"/>
-              </a:spcBef>
+            <a:lvl7pPr marL="3200400" lvl="6" indent="-317500" algn="ctr">
+              <a:spcBef>
+                <a:spcPts val="1600"/>
+              </a:spcBef>
+              <a:spcAft>
+                <a:spcPts val="0"/>
+              </a:spcAft>
               <a:buSzPts val="1400"/>
               <a:buChar char="●"/>
               <a:defRPr/>
             </a:lvl7pPr>
-            <a:lvl8pPr lvl="7" algn="ctr">
-              <a:spcBef>
-                <a:spcPts val="0"/>
-              </a:spcBef>
+            <a:lvl8pPr marL="3657600" lvl="7" indent="-317500" algn="ctr">
+              <a:spcBef>
+                <a:spcPts val="1600"/>
+              </a:spcBef>
+              <a:spcAft>
+                <a:spcPts val="0"/>
+              </a:spcAft>
               <a:buSzPts val="1400"/>
               <a:buChar char="○"/>
               <a:defRPr/>
             </a:lvl8pPr>
-            <a:lvl9pPr lvl="8" algn="ctr">
-              <a:spcBef>
-                <a:spcPts val="0"/>
-              </a:spcBef>
+            <a:lvl9pPr marL="4114800" lvl="8" indent="-317500" algn="ctr">
+              <a:spcBef>
+                <a:spcPts val="1600"/>
+              </a:spcBef>
+              <a:spcAft>
+                <a:spcPts val="1600"/>
+              </a:spcAft>
               <a:buSzPts val="1400"/>
               <a:buChar char="■"/>
               <a:defRPr/>
@@ -2914,13 +3082,16 @@
               <a:spcBef>
                 <a:spcPts val="0"/>
               </a:spcBef>
+              <a:spcAft>
+                <a:spcPts val="0"/>
+              </a:spcAft>
               <a:buNone/>
             </a:pPr>
             <a:fld id="{00000000-1234-1234-1234-123412341234}" type="slidenum">
               <a:rPr lang="en"/>
               <a:t>‹#›</a:t>
             </a:fld>
-            <a:endParaRPr lang="en"/>
+            <a:endParaRPr/>
           </a:p>
         </p:txBody>
       </p:sp>
@@ -2986,13 +3157,16 @@
               <a:spcBef>
                 <a:spcPts val="0"/>
               </a:spcBef>
+              <a:spcAft>
+                <a:spcPts val="0"/>
+              </a:spcAft>
               <a:buNone/>
             </a:pPr>
             <a:fld id="{00000000-1234-1234-1234-123412341234}" type="slidenum">
               <a:rPr lang="en"/>
               <a:t>‹#›</a:t>
             </a:fld>
-            <a:endParaRPr lang="en"/>
+            <a:endParaRPr/>
           </a:p>
         </p:txBody>
       </p:sp>
@@ -3060,6 +3234,9 @@
               <a:spcBef>
                 <a:spcPts val="0"/>
               </a:spcBef>
+              <a:spcAft>
+                <a:spcPts val="0"/>
+              </a:spcAft>
               <a:buNone/>
             </a:pPr>
             <a:endParaRPr/>
@@ -3097,6 +3274,9 @@
               <a:spcBef>
                 <a:spcPts val="0"/>
               </a:spcBef>
+              <a:spcAft>
+                <a:spcPts val="0"/>
+              </a:spcAft>
               <a:buNone/>
             </a:pPr>
             <a:endParaRPr/>
@@ -3129,6 +3309,9 @@
               <a:spcBef>
                 <a:spcPts val="0"/>
               </a:spcBef>
+              <a:spcAft>
+                <a:spcPts val="0"/>
+              </a:spcAft>
               <a:buSzPts val="3600"/>
               <a:buNone/>
               <a:defRPr sz="3600"/>
@@ -3137,6 +3320,9 @@
               <a:spcBef>
                 <a:spcPts val="0"/>
               </a:spcBef>
+              <a:spcAft>
+                <a:spcPts val="0"/>
+              </a:spcAft>
               <a:buSzPts val="3600"/>
               <a:buNone/>
               <a:defRPr sz="3600"/>
@@ -3145,6 +3331,9 @@
               <a:spcBef>
                 <a:spcPts val="0"/>
               </a:spcBef>
+              <a:spcAft>
+                <a:spcPts val="0"/>
+              </a:spcAft>
               <a:buSzPts val="3600"/>
               <a:buNone/>
               <a:defRPr sz="3600"/>
@@ -3153,6 +3342,9 @@
               <a:spcBef>
                 <a:spcPts val="0"/>
               </a:spcBef>
+              <a:spcAft>
+                <a:spcPts val="0"/>
+              </a:spcAft>
               <a:buSzPts val="3600"/>
               <a:buNone/>
               <a:defRPr sz="3600"/>
@@ -3161,6 +3353,9 @@
               <a:spcBef>
                 <a:spcPts val="0"/>
               </a:spcBef>
+              <a:spcAft>
+                <a:spcPts val="0"/>
+              </a:spcAft>
               <a:buSzPts val="3600"/>
               <a:buNone/>
               <a:defRPr sz="3600"/>
@@ -3169,6 +3364,9 @@
               <a:spcBef>
                 <a:spcPts val="0"/>
               </a:spcBef>
+              <a:spcAft>
+                <a:spcPts val="0"/>
+              </a:spcAft>
               <a:buSzPts val="3600"/>
               <a:buNone/>
               <a:defRPr sz="3600"/>
@@ -3177,6 +3375,9 @@
               <a:spcBef>
                 <a:spcPts val="0"/>
               </a:spcBef>
+              <a:spcAft>
+                <a:spcPts val="0"/>
+              </a:spcAft>
               <a:buSzPts val="3600"/>
               <a:buNone/>
               <a:defRPr sz="3600"/>
@@ -3185,6 +3386,9 @@
               <a:spcBef>
                 <a:spcPts val="0"/>
               </a:spcBef>
+              <a:spcAft>
+                <a:spcPts val="0"/>
+              </a:spcAft>
               <a:buSzPts val="3600"/>
               <a:buNone/>
               <a:defRPr sz="3600"/>
@@ -3193,6 +3397,9 @@
               <a:spcBef>
                 <a:spcPts val="0"/>
               </a:spcBef>
+              <a:spcAft>
+                <a:spcPts val="0"/>
+              </a:spcAft>
               <a:buSzPts val="3600"/>
               <a:buNone/>
               <a:defRPr sz="3600"/>
@@ -3232,13 +3439,16 @@
               <a:spcBef>
                 <a:spcPts val="0"/>
               </a:spcBef>
+              <a:spcAft>
+                <a:spcPts val="0"/>
+              </a:spcAft>
               <a:buNone/>
             </a:pPr>
             <a:fld id="{00000000-1234-1234-1234-123412341234}" type="slidenum">
               <a:rPr lang="en"/>
               <a:t>‹#›</a:t>
             </a:fld>
-            <a:endParaRPr lang="en"/>
+            <a:endParaRPr/>
           </a:p>
         </p:txBody>
       </p:sp>
@@ -3306,6 +3516,9 @@
               <a:spcBef>
                 <a:spcPts val="0"/>
               </a:spcBef>
+              <a:spcAft>
+                <a:spcPts val="0"/>
+              </a:spcAft>
               <a:buNone/>
             </a:pPr>
             <a:endParaRPr/>
@@ -3364,6 +3577,9 @@
               <a:spcBef>
                 <a:spcPts val="0"/>
               </a:spcBef>
+              <a:spcAft>
+                <a:spcPts val="0"/>
+              </a:spcAft>
               <a:buSzPts val="4800"/>
               <a:buNone/>
               <a:defRPr sz="4800"/>
@@ -3372,6 +3588,9 @@
               <a:spcBef>
                 <a:spcPts val="0"/>
               </a:spcBef>
+              <a:spcAft>
+                <a:spcPts val="0"/>
+              </a:spcAft>
               <a:buSzPts val="4800"/>
               <a:buNone/>
               <a:defRPr sz="4800"/>
@@ -3380,6 +3599,9 @@
               <a:spcBef>
                 <a:spcPts val="0"/>
               </a:spcBef>
+              <a:spcAft>
+                <a:spcPts val="0"/>
+              </a:spcAft>
               <a:buSzPts val="4800"/>
               <a:buNone/>
               <a:defRPr sz="4800"/>
@@ -3388,6 +3610,9 @@
               <a:spcBef>
                 <a:spcPts val="0"/>
               </a:spcBef>
+              <a:spcAft>
+                <a:spcPts val="0"/>
+              </a:spcAft>
               <a:buSzPts val="4800"/>
               <a:buNone/>
               <a:defRPr sz="4800"/>
@@ -3396,6 +3621,9 @@
               <a:spcBef>
                 <a:spcPts val="0"/>
               </a:spcBef>
+              <a:spcAft>
+                <a:spcPts val="0"/>
+              </a:spcAft>
               <a:buSzPts val="4800"/>
               <a:buNone/>
               <a:defRPr sz="4800"/>
@@ -3404,6 +3632,9 @@
               <a:spcBef>
                 <a:spcPts val="0"/>
               </a:spcBef>
+              <a:spcAft>
+                <a:spcPts val="0"/>
+              </a:spcAft>
               <a:buSzPts val="4800"/>
               <a:buNone/>
               <a:defRPr sz="4800"/>
@@ -3412,6 +3643,9 @@
               <a:spcBef>
                 <a:spcPts val="0"/>
               </a:spcBef>
+              <a:spcAft>
+                <a:spcPts val="0"/>
+              </a:spcAft>
               <a:buSzPts val="4800"/>
               <a:buNone/>
               <a:defRPr sz="4800"/>
@@ -3420,6 +3654,9 @@
               <a:spcBef>
                 <a:spcPts val="0"/>
               </a:spcBef>
+              <a:spcAft>
+                <a:spcPts val="0"/>
+              </a:spcAft>
               <a:buSzPts val="4800"/>
               <a:buNone/>
               <a:defRPr sz="4800"/>
@@ -3428,6 +3665,9 @@
               <a:spcBef>
                 <a:spcPts val="0"/>
               </a:spcBef>
+              <a:spcAft>
+                <a:spcPts val="0"/>
+              </a:spcAft>
               <a:buSzPts val="4800"/>
               <a:buNone/>
               <a:defRPr sz="4800"/>
@@ -3460,74 +3700,101 @@
         <p:txBody>
           <a:bodyPr wrap="square" lIns="91425" tIns="91425" rIns="91425" bIns="91425" anchor="t" anchorCtr="0"/>
           <a:lstStyle>
-            <a:lvl1pPr lvl="0">
-              <a:spcBef>
-                <a:spcPts val="0"/>
-              </a:spcBef>
+            <a:lvl1pPr marL="457200" lvl="0" indent="-482600">
+              <a:spcBef>
+                <a:spcPts val="0"/>
+              </a:spcBef>
+              <a:spcAft>
+                <a:spcPts val="0"/>
+              </a:spcAft>
               <a:buSzPts val="4000"/>
               <a:buChar char="●"/>
               <a:defRPr sz="4000"/>
             </a:lvl1pPr>
-            <a:lvl2pPr lvl="1">
-              <a:spcBef>
-                <a:spcPts val="0"/>
-              </a:spcBef>
+            <a:lvl2pPr marL="914400" lvl="1" indent="-317500">
+              <a:spcBef>
+                <a:spcPts val="1600"/>
+              </a:spcBef>
+              <a:spcAft>
+                <a:spcPts val="0"/>
+              </a:spcAft>
               <a:buSzPts val="1400"/>
               <a:buChar char="○"/>
               <a:defRPr/>
             </a:lvl2pPr>
-            <a:lvl3pPr lvl="2">
-              <a:spcBef>
-                <a:spcPts val="0"/>
-              </a:spcBef>
+            <a:lvl3pPr marL="1371600" lvl="2" indent="-317500">
+              <a:spcBef>
+                <a:spcPts val="1600"/>
+              </a:spcBef>
+              <a:spcAft>
+                <a:spcPts val="0"/>
+              </a:spcAft>
               <a:buSzPts val="1400"/>
               <a:buChar char="■"/>
               <a:defRPr/>
             </a:lvl3pPr>
-            <a:lvl4pPr lvl="3">
-              <a:spcBef>
-                <a:spcPts val="0"/>
-              </a:spcBef>
+            <a:lvl4pPr marL="1828800" lvl="3" indent="-317500">
+              <a:spcBef>
+                <a:spcPts val="1600"/>
+              </a:spcBef>
+              <a:spcAft>
+                <a:spcPts val="0"/>
+              </a:spcAft>
               <a:buSzPts val="1400"/>
               <a:buChar char="●"/>
               <a:defRPr/>
             </a:lvl4pPr>
-            <a:lvl5pPr lvl="4">
-              <a:spcBef>
-                <a:spcPts val="0"/>
-              </a:spcBef>
+            <a:lvl5pPr marL="2286000" lvl="4" indent="-317500">
+              <a:spcBef>
+                <a:spcPts val="1600"/>
+              </a:spcBef>
+              <a:spcAft>
+                <a:spcPts val="0"/>
+              </a:spcAft>
               <a:buSzPts val="1400"/>
               <a:buChar char="○"/>
               <a:defRPr/>
             </a:lvl5pPr>
-            <a:lvl6pPr lvl="5">
-              <a:spcBef>
-                <a:spcPts val="0"/>
-              </a:spcBef>
+            <a:lvl6pPr marL="2743200" lvl="5" indent="-317500">
+              <a:spcBef>
+                <a:spcPts val="1600"/>
+              </a:spcBef>
+              <a:spcAft>
+                <a:spcPts val="0"/>
+              </a:spcAft>
               <a:buSzPts val="1400"/>
               <a:buChar char="■"/>
               <a:defRPr/>
             </a:lvl6pPr>
-            <a:lvl7pPr lvl="6">
-              <a:spcBef>
-                <a:spcPts val="0"/>
-              </a:spcBef>
+            <a:lvl7pPr marL="3200400" lvl="6" indent="-317500">
+              <a:spcBef>
+                <a:spcPts val="1600"/>
+              </a:spcBef>
+              <a:spcAft>
+                <a:spcPts val="0"/>
+              </a:spcAft>
               <a:buSzPts val="1400"/>
               <a:buChar char="●"/>
               <a:defRPr/>
             </a:lvl7pPr>
-            <a:lvl8pPr lvl="7">
-              <a:spcBef>
-                <a:spcPts val="0"/>
-              </a:spcBef>
+            <a:lvl8pPr marL="3657600" lvl="7" indent="-317500">
+              <a:spcBef>
+                <a:spcPts val="1600"/>
+              </a:spcBef>
+              <a:spcAft>
+                <a:spcPts val="0"/>
+              </a:spcAft>
               <a:buSzPts val="1400"/>
               <a:buChar char="○"/>
               <a:defRPr/>
             </a:lvl8pPr>
-            <a:lvl9pPr lvl="8">
-              <a:spcBef>
-                <a:spcPts val="0"/>
-              </a:spcBef>
+            <a:lvl9pPr marL="4114800" lvl="8" indent="-317500">
+              <a:spcBef>
+                <a:spcPts val="1600"/>
+              </a:spcBef>
+              <a:spcAft>
+                <a:spcPts val="1600"/>
+              </a:spcAft>
               <a:buSzPts val="1400"/>
               <a:buChar char="■"/>
               <a:defRPr/>
@@ -3567,13 +3834,16 @@
               <a:spcBef>
                 <a:spcPts val="0"/>
               </a:spcBef>
+              <a:spcAft>
+                <a:spcPts val="0"/>
+              </a:spcAft>
               <a:buNone/>
             </a:pPr>
             <a:fld id="{00000000-1234-1234-1234-123412341234}" type="slidenum">
               <a:rPr lang="en"/>
               <a:t>‹#›</a:t>
             </a:fld>
-            <a:endParaRPr lang="en"/>
+            <a:endParaRPr/>
           </a:p>
         </p:txBody>
       </p:sp>
@@ -3662,6 +3932,9 @@
               <a:spcBef>
                 <a:spcPts val="0"/>
               </a:spcBef>
+              <a:spcAft>
+                <a:spcPts val="0"/>
+              </a:spcAft>
               <a:buSzPts val="3200"/>
               <a:buNone/>
               <a:defRPr/>
@@ -3670,6 +3943,9 @@
               <a:spcBef>
                 <a:spcPts val="0"/>
               </a:spcBef>
+              <a:spcAft>
+                <a:spcPts val="0"/>
+              </a:spcAft>
               <a:buSzPts val="3200"/>
               <a:buNone/>
               <a:defRPr/>
@@ -3678,6 +3954,9 @@
               <a:spcBef>
                 <a:spcPts val="0"/>
               </a:spcBef>
+              <a:spcAft>
+                <a:spcPts val="0"/>
+              </a:spcAft>
               <a:buSzPts val="3200"/>
               <a:buNone/>
               <a:defRPr/>
@@ -3686,6 +3965,9 @@
               <a:spcBef>
                 <a:spcPts val="0"/>
               </a:spcBef>
+              <a:spcAft>
+                <a:spcPts val="0"/>
+              </a:spcAft>
               <a:buSzPts val="3200"/>
               <a:buNone/>
               <a:defRPr/>
@@ -3694,6 +3976,9 @@
               <a:spcBef>
                 <a:spcPts val="0"/>
               </a:spcBef>
+              <a:spcAft>
+                <a:spcPts val="0"/>
+              </a:spcAft>
               <a:buSzPts val="3200"/>
               <a:buNone/>
               <a:defRPr/>
@@ -3702,6 +3987,9 @@
               <a:spcBef>
                 <a:spcPts val="0"/>
               </a:spcBef>
+              <a:spcAft>
+                <a:spcPts val="0"/>
+              </a:spcAft>
               <a:buSzPts val="3200"/>
               <a:buNone/>
               <a:defRPr/>
@@ -3710,6 +3998,9 @@
               <a:spcBef>
                 <a:spcPts val="0"/>
               </a:spcBef>
+              <a:spcAft>
+                <a:spcPts val="0"/>
+              </a:spcAft>
               <a:buSzPts val="3200"/>
               <a:buNone/>
               <a:defRPr/>
@@ -3718,6 +4009,9 @@
               <a:spcBef>
                 <a:spcPts val="0"/>
               </a:spcBef>
+              <a:spcAft>
+                <a:spcPts val="0"/>
+              </a:spcAft>
               <a:buSzPts val="3200"/>
               <a:buNone/>
               <a:defRPr/>
@@ -3726,6 +4020,9 @@
               <a:spcBef>
                 <a:spcPts val="0"/>
               </a:spcBef>
+              <a:spcAft>
+                <a:spcPts val="0"/>
+              </a:spcAft>
               <a:buSzPts val="3200"/>
               <a:buNone/>
               <a:defRPr/>
@@ -3758,74 +4055,101 @@
         <p:txBody>
           <a:bodyPr wrap="square" lIns="91425" tIns="91425" rIns="91425" bIns="91425" anchor="t" anchorCtr="0"/>
           <a:lstStyle>
-            <a:lvl1pPr lvl="0">
-              <a:spcBef>
-                <a:spcPts val="0"/>
-              </a:spcBef>
+            <a:lvl1pPr marL="457200" lvl="0" indent="-317500">
+              <a:spcBef>
+                <a:spcPts val="0"/>
+              </a:spcBef>
+              <a:spcAft>
+                <a:spcPts val="0"/>
+              </a:spcAft>
               <a:buSzPts val="1400"/>
               <a:buChar char="●"/>
               <a:defRPr sz="1400"/>
             </a:lvl1pPr>
-            <a:lvl2pPr lvl="1">
-              <a:spcBef>
-                <a:spcPts val="0"/>
-              </a:spcBef>
+            <a:lvl2pPr marL="914400" lvl="1" indent="-304800">
+              <a:spcBef>
+                <a:spcPts val="1600"/>
+              </a:spcBef>
+              <a:spcAft>
+                <a:spcPts val="0"/>
+              </a:spcAft>
               <a:buSzPts val="1200"/>
               <a:buChar char="○"/>
               <a:defRPr sz="1200"/>
             </a:lvl2pPr>
-            <a:lvl3pPr lvl="2">
-              <a:spcBef>
-                <a:spcPts val="0"/>
-              </a:spcBef>
+            <a:lvl3pPr marL="1371600" lvl="2" indent="-304800">
+              <a:spcBef>
+                <a:spcPts val="1600"/>
+              </a:spcBef>
+              <a:spcAft>
+                <a:spcPts val="0"/>
+              </a:spcAft>
               <a:buSzPts val="1200"/>
               <a:buChar char="■"/>
               <a:defRPr sz="1200"/>
             </a:lvl3pPr>
-            <a:lvl4pPr lvl="3">
-              <a:spcBef>
-                <a:spcPts val="0"/>
-              </a:spcBef>
+            <a:lvl4pPr marL="1828800" lvl="3" indent="-304800">
+              <a:spcBef>
+                <a:spcPts val="1600"/>
+              </a:spcBef>
+              <a:spcAft>
+                <a:spcPts val="0"/>
+              </a:spcAft>
               <a:buSzPts val="1200"/>
               <a:buChar char="●"/>
               <a:defRPr sz="1200"/>
             </a:lvl4pPr>
-            <a:lvl5pPr lvl="4">
-              <a:spcBef>
-                <a:spcPts val="0"/>
-              </a:spcBef>
+            <a:lvl5pPr marL="2286000" lvl="4" indent="-304800">
+              <a:spcBef>
+                <a:spcPts val="1600"/>
+              </a:spcBef>
+              <a:spcAft>
+                <a:spcPts val="0"/>
+              </a:spcAft>
               <a:buSzPts val="1200"/>
               <a:buChar char="○"/>
               <a:defRPr sz="1200"/>
             </a:lvl5pPr>
-            <a:lvl6pPr lvl="5">
-              <a:spcBef>
-                <a:spcPts val="0"/>
-              </a:spcBef>
+            <a:lvl6pPr marL="2743200" lvl="5" indent="-304800">
+              <a:spcBef>
+                <a:spcPts val="1600"/>
+              </a:spcBef>
+              <a:spcAft>
+                <a:spcPts val="0"/>
+              </a:spcAft>
               <a:buSzPts val="1200"/>
               <a:buChar char="■"/>
               <a:defRPr sz="1200"/>
             </a:lvl6pPr>
-            <a:lvl7pPr lvl="6">
-              <a:spcBef>
-                <a:spcPts val="0"/>
-              </a:spcBef>
+            <a:lvl7pPr marL="3200400" lvl="6" indent="-304800">
+              <a:spcBef>
+                <a:spcPts val="1600"/>
+              </a:spcBef>
+              <a:spcAft>
+                <a:spcPts val="0"/>
+              </a:spcAft>
               <a:buSzPts val="1200"/>
               <a:buChar char="●"/>
               <a:defRPr sz="1200"/>
             </a:lvl7pPr>
-            <a:lvl8pPr lvl="7">
-              <a:spcBef>
-                <a:spcPts val="0"/>
-              </a:spcBef>
+            <a:lvl8pPr marL="3657600" lvl="7" indent="-304800">
+              <a:spcBef>
+                <a:spcPts val="1600"/>
+              </a:spcBef>
+              <a:spcAft>
+                <a:spcPts val="0"/>
+              </a:spcAft>
               <a:buSzPts val="1200"/>
               <a:buChar char="○"/>
               <a:defRPr sz="1200"/>
             </a:lvl8pPr>
-            <a:lvl9pPr lvl="8">
-              <a:spcBef>
-                <a:spcPts val="0"/>
-              </a:spcBef>
+            <a:lvl9pPr marL="4114800" lvl="8" indent="-304800">
+              <a:spcBef>
+                <a:spcPts val="1600"/>
+              </a:spcBef>
+              <a:spcAft>
+                <a:spcPts val="1600"/>
+              </a:spcAft>
               <a:buSzPts val="1200"/>
               <a:buChar char="■"/>
               <a:defRPr sz="1200"/>
@@ -3858,74 +4182,101 @@
         <p:txBody>
           <a:bodyPr wrap="square" lIns="91425" tIns="91425" rIns="91425" bIns="91425" anchor="t" anchorCtr="0"/>
           <a:lstStyle>
-            <a:lvl1pPr lvl="0">
-              <a:spcBef>
-                <a:spcPts val="0"/>
-              </a:spcBef>
+            <a:lvl1pPr marL="457200" lvl="0" indent="-317500">
+              <a:spcBef>
+                <a:spcPts val="0"/>
+              </a:spcBef>
+              <a:spcAft>
+                <a:spcPts val="0"/>
+              </a:spcAft>
               <a:buSzPts val="1400"/>
               <a:buChar char="●"/>
               <a:defRPr sz="1400"/>
             </a:lvl1pPr>
-            <a:lvl2pPr lvl="1">
-              <a:spcBef>
-                <a:spcPts val="0"/>
-              </a:spcBef>
+            <a:lvl2pPr marL="914400" lvl="1" indent="-304800">
+              <a:spcBef>
+                <a:spcPts val="1600"/>
+              </a:spcBef>
+              <a:spcAft>
+                <a:spcPts val="0"/>
+              </a:spcAft>
               <a:buSzPts val="1200"/>
               <a:buChar char="○"/>
               <a:defRPr sz="1200"/>
             </a:lvl2pPr>
-            <a:lvl3pPr lvl="2">
-              <a:spcBef>
-                <a:spcPts val="0"/>
-              </a:spcBef>
+            <a:lvl3pPr marL="1371600" lvl="2" indent="-304800">
+              <a:spcBef>
+                <a:spcPts val="1600"/>
+              </a:spcBef>
+              <a:spcAft>
+                <a:spcPts val="0"/>
+              </a:spcAft>
               <a:buSzPts val="1200"/>
               <a:buChar char="■"/>
               <a:defRPr sz="1200"/>
             </a:lvl3pPr>
-            <a:lvl4pPr lvl="3">
-              <a:spcBef>
-                <a:spcPts val="0"/>
-              </a:spcBef>
+            <a:lvl4pPr marL="1828800" lvl="3" indent="-304800">
+              <a:spcBef>
+                <a:spcPts val="1600"/>
+              </a:spcBef>
+              <a:spcAft>
+                <a:spcPts val="0"/>
+              </a:spcAft>
               <a:buSzPts val="1200"/>
               <a:buChar char="●"/>
               <a:defRPr sz="1200"/>
             </a:lvl4pPr>
-            <a:lvl5pPr lvl="4">
-              <a:spcBef>
-                <a:spcPts val="0"/>
-              </a:spcBef>
+            <a:lvl5pPr marL="2286000" lvl="4" indent="-304800">
+              <a:spcBef>
+                <a:spcPts val="1600"/>
+              </a:spcBef>
+              <a:spcAft>
+                <a:spcPts val="0"/>
+              </a:spcAft>
               <a:buSzPts val="1200"/>
               <a:buChar char="○"/>
               <a:defRPr sz="1200"/>
             </a:lvl5pPr>
-            <a:lvl6pPr lvl="5">
-              <a:spcBef>
-                <a:spcPts val="0"/>
-              </a:spcBef>
+            <a:lvl6pPr marL="2743200" lvl="5" indent="-304800">
+              <a:spcBef>
+                <a:spcPts val="1600"/>
+              </a:spcBef>
+              <a:spcAft>
+                <a:spcPts val="0"/>
+              </a:spcAft>
               <a:buSzPts val="1200"/>
               <a:buChar char="■"/>
               <a:defRPr sz="1200"/>
             </a:lvl6pPr>
-            <a:lvl7pPr lvl="6">
-              <a:spcBef>
-                <a:spcPts val="0"/>
-              </a:spcBef>
+            <a:lvl7pPr marL="3200400" lvl="6" indent="-304800">
+              <a:spcBef>
+                <a:spcPts val="1600"/>
+              </a:spcBef>
+              <a:spcAft>
+                <a:spcPts val="0"/>
+              </a:spcAft>
               <a:buSzPts val="1200"/>
               <a:buChar char="●"/>
               <a:defRPr sz="1200"/>
             </a:lvl7pPr>
-            <a:lvl8pPr lvl="7">
-              <a:spcBef>
-                <a:spcPts val="0"/>
-              </a:spcBef>
+            <a:lvl8pPr marL="3657600" lvl="7" indent="-304800">
+              <a:spcBef>
+                <a:spcPts val="1600"/>
+              </a:spcBef>
+              <a:spcAft>
+                <a:spcPts val="0"/>
+              </a:spcAft>
               <a:buSzPts val="1200"/>
               <a:buChar char="○"/>
               <a:defRPr sz="1200"/>
             </a:lvl8pPr>
-            <a:lvl9pPr lvl="8">
-              <a:spcBef>
-                <a:spcPts val="0"/>
-              </a:spcBef>
+            <a:lvl9pPr marL="4114800" lvl="8" indent="-304800">
+              <a:spcBef>
+                <a:spcPts val="1600"/>
+              </a:spcBef>
+              <a:spcAft>
+                <a:spcPts val="1600"/>
+              </a:spcAft>
               <a:buSzPts val="1200"/>
               <a:buChar char="■"/>
               <a:defRPr sz="1200"/>
@@ -3965,13 +4316,16 @@
               <a:spcBef>
                 <a:spcPts val="0"/>
               </a:spcBef>
+              <a:spcAft>
+                <a:spcPts val="0"/>
+              </a:spcAft>
               <a:buNone/>
             </a:pPr>
             <a:fld id="{00000000-1234-1234-1234-123412341234}" type="slidenum">
               <a:rPr lang="en"/>
               <a:t>‹#›</a:t>
             </a:fld>
-            <a:endParaRPr lang="en"/>
+            <a:endParaRPr/>
           </a:p>
         </p:txBody>
       </p:sp>
@@ -4034,6 +4388,9 @@
               <a:spcBef>
                 <a:spcPts val="0"/>
               </a:spcBef>
+              <a:spcAft>
+                <a:spcPts val="0"/>
+              </a:spcAft>
               <a:buSzPts val="3200"/>
               <a:buNone/>
               <a:defRPr/>
@@ -4042,6 +4399,9 @@
               <a:spcBef>
                 <a:spcPts val="0"/>
               </a:spcBef>
+              <a:spcAft>
+                <a:spcPts val="0"/>
+              </a:spcAft>
               <a:buSzPts val="3200"/>
               <a:buNone/>
               <a:defRPr/>
@@ -4050,6 +4410,9 @@
               <a:spcBef>
                 <a:spcPts val="0"/>
               </a:spcBef>
+              <a:spcAft>
+                <a:spcPts val="0"/>
+              </a:spcAft>
               <a:buSzPts val="3200"/>
               <a:buNone/>
               <a:defRPr/>
@@ -4058,6 +4421,9 @@
               <a:spcBef>
                 <a:spcPts val="0"/>
               </a:spcBef>
+              <a:spcAft>
+                <a:spcPts val="0"/>
+              </a:spcAft>
               <a:buSzPts val="3200"/>
               <a:buNone/>
               <a:defRPr/>
@@ -4066,6 +4432,9 @@
               <a:spcBef>
                 <a:spcPts val="0"/>
               </a:spcBef>
+              <a:spcAft>
+                <a:spcPts val="0"/>
+              </a:spcAft>
               <a:buSzPts val="3200"/>
               <a:buNone/>
               <a:defRPr/>
@@ -4074,6 +4443,9 @@
               <a:spcBef>
                 <a:spcPts val="0"/>
               </a:spcBef>
+              <a:spcAft>
+                <a:spcPts val="0"/>
+              </a:spcAft>
               <a:buSzPts val="3200"/>
               <a:buNone/>
               <a:defRPr/>
@@ -4082,6 +4454,9 @@
               <a:spcBef>
                 <a:spcPts val="0"/>
               </a:spcBef>
+              <a:spcAft>
+                <a:spcPts val="0"/>
+              </a:spcAft>
               <a:buSzPts val="3200"/>
               <a:buNone/>
               <a:defRPr/>
@@ -4090,6 +4465,9 @@
               <a:spcBef>
                 <a:spcPts val="0"/>
               </a:spcBef>
+              <a:spcAft>
+                <a:spcPts val="0"/>
+              </a:spcAft>
               <a:buSzPts val="3200"/>
               <a:buNone/>
               <a:defRPr/>
@@ -4098,6 +4476,9 @@
               <a:spcBef>
                 <a:spcPts val="0"/>
               </a:spcBef>
+              <a:spcAft>
+                <a:spcPts val="0"/>
+              </a:spcAft>
               <a:buSzPts val="3200"/>
               <a:buNone/>
               <a:defRPr/>
@@ -4137,13 +4518,16 @@
               <a:spcBef>
                 <a:spcPts val="0"/>
               </a:spcBef>
+              <a:spcAft>
+                <a:spcPts val="0"/>
+              </a:spcAft>
               <a:buNone/>
             </a:pPr>
             <a:fld id="{00000000-1234-1234-1234-123412341234}" type="slidenum">
               <a:rPr lang="en"/>
               <a:t>‹#›</a:t>
             </a:fld>
-            <a:endParaRPr lang="en"/>
+            <a:endParaRPr/>
           </a:p>
         </p:txBody>
       </p:sp>
@@ -4232,6 +4616,9 @@
               <a:spcBef>
                 <a:spcPts val="0"/>
               </a:spcBef>
+              <a:spcAft>
+                <a:spcPts val="0"/>
+              </a:spcAft>
               <a:buSzPts val="2400"/>
               <a:buNone/>
               <a:defRPr sz="2400"/>
@@ -4240,6 +4627,9 @@
               <a:spcBef>
                 <a:spcPts val="0"/>
               </a:spcBef>
+              <a:spcAft>
+                <a:spcPts val="0"/>
+              </a:spcAft>
               <a:buSzPts val="2400"/>
               <a:buNone/>
               <a:defRPr sz="2400"/>
@@ -4248,6 +4638,9 @@
               <a:spcBef>
                 <a:spcPts val="0"/>
               </a:spcBef>
+              <a:spcAft>
+                <a:spcPts val="0"/>
+              </a:spcAft>
               <a:buSzPts val="2400"/>
               <a:buNone/>
               <a:defRPr sz="2400"/>
@@ -4256,6 +4649,9 @@
               <a:spcBef>
                 <a:spcPts val="0"/>
               </a:spcBef>
+              <a:spcAft>
+                <a:spcPts val="0"/>
+              </a:spcAft>
               <a:buSzPts val="2400"/>
               <a:buNone/>
               <a:defRPr sz="2400"/>
@@ -4264,6 +4660,9 @@
               <a:spcBef>
                 <a:spcPts val="0"/>
               </a:spcBef>
+              <a:spcAft>
+                <a:spcPts val="0"/>
+              </a:spcAft>
               <a:buSzPts val="2400"/>
               <a:buNone/>
               <a:defRPr sz="2400"/>
@@ -4272,6 +4671,9 @@
               <a:spcBef>
                 <a:spcPts val="0"/>
               </a:spcBef>
+              <a:spcAft>
+                <a:spcPts val="0"/>
+              </a:spcAft>
               <a:buSzPts val="2400"/>
               <a:buNone/>
               <a:defRPr sz="2400"/>
@@ -4280,6 +4682,9 @@
               <a:spcBef>
                 <a:spcPts val="0"/>
               </a:spcBef>
+              <a:spcAft>
+                <a:spcPts val="0"/>
+              </a:spcAft>
               <a:buSzPts val="2400"/>
               <a:buNone/>
               <a:defRPr sz="2400"/>
@@ -4288,6 +4693,9 @@
               <a:spcBef>
                 <a:spcPts val="0"/>
               </a:spcBef>
+              <a:spcAft>
+                <a:spcPts val="0"/>
+              </a:spcAft>
               <a:buSzPts val="2400"/>
               <a:buNone/>
               <a:defRPr sz="2400"/>
@@ -4296,6 +4704,9 @@
               <a:spcBef>
                 <a:spcPts val="0"/>
               </a:spcBef>
+              <a:spcAft>
+                <a:spcPts val="0"/>
+              </a:spcAft>
               <a:buSzPts val="2400"/>
               <a:buNone/>
               <a:defRPr sz="2400"/>
@@ -4328,74 +4739,101 @@
         <p:txBody>
           <a:bodyPr wrap="square" lIns="91425" tIns="91425" rIns="91425" bIns="91425" anchor="t" anchorCtr="0"/>
           <a:lstStyle>
-            <a:lvl1pPr lvl="0">
-              <a:spcBef>
-                <a:spcPts val="0"/>
-              </a:spcBef>
+            <a:lvl1pPr marL="457200" lvl="0" indent="-304800">
+              <a:spcBef>
+                <a:spcPts val="0"/>
+              </a:spcBef>
+              <a:spcAft>
+                <a:spcPts val="0"/>
+              </a:spcAft>
               <a:buSzPts val="1200"/>
               <a:buChar char="●"/>
               <a:defRPr sz="1200"/>
             </a:lvl1pPr>
-            <a:lvl2pPr lvl="1">
-              <a:spcBef>
-                <a:spcPts val="0"/>
-              </a:spcBef>
+            <a:lvl2pPr marL="914400" lvl="1" indent="-304800">
+              <a:spcBef>
+                <a:spcPts val="1600"/>
+              </a:spcBef>
+              <a:spcAft>
+                <a:spcPts val="0"/>
+              </a:spcAft>
               <a:buSzPts val="1200"/>
               <a:buChar char="○"/>
               <a:defRPr sz="1200"/>
             </a:lvl2pPr>
-            <a:lvl3pPr lvl="2">
-              <a:spcBef>
-                <a:spcPts val="0"/>
-              </a:spcBef>
+            <a:lvl3pPr marL="1371600" lvl="2" indent="-304800">
+              <a:spcBef>
+                <a:spcPts val="1600"/>
+              </a:spcBef>
+              <a:spcAft>
+                <a:spcPts val="0"/>
+              </a:spcAft>
               <a:buSzPts val="1200"/>
               <a:buChar char="■"/>
               <a:defRPr sz="1200"/>
             </a:lvl3pPr>
-            <a:lvl4pPr lvl="3">
-              <a:spcBef>
-                <a:spcPts val="0"/>
-              </a:spcBef>
+            <a:lvl4pPr marL="1828800" lvl="3" indent="-304800">
+              <a:spcBef>
+                <a:spcPts val="1600"/>
+              </a:spcBef>
+              <a:spcAft>
+                <a:spcPts val="0"/>
+              </a:spcAft>
               <a:buSzPts val="1200"/>
               <a:buChar char="●"/>
               <a:defRPr sz="1200"/>
             </a:lvl4pPr>
-            <a:lvl5pPr lvl="4">
-              <a:spcBef>
-                <a:spcPts val="0"/>
-              </a:spcBef>
+            <a:lvl5pPr marL="2286000" lvl="4" indent="-304800">
+              <a:spcBef>
+                <a:spcPts val="1600"/>
+              </a:spcBef>
+              <a:spcAft>
+                <a:spcPts val="0"/>
+              </a:spcAft>
               <a:buSzPts val="1200"/>
               <a:buChar char="○"/>
               <a:defRPr sz="1200"/>
             </a:lvl5pPr>
-            <a:lvl6pPr lvl="5">
-              <a:spcBef>
-                <a:spcPts val="0"/>
-              </a:spcBef>
+            <a:lvl6pPr marL="2743200" lvl="5" indent="-304800">
+              <a:spcBef>
+                <a:spcPts val="1600"/>
+              </a:spcBef>
+              <a:spcAft>
+                <a:spcPts val="0"/>
+              </a:spcAft>
               <a:buSzPts val="1200"/>
               <a:buChar char="■"/>
               <a:defRPr sz="1200"/>
             </a:lvl6pPr>
-            <a:lvl7pPr lvl="6">
-              <a:spcBef>
-                <a:spcPts val="0"/>
-              </a:spcBef>
+            <a:lvl7pPr marL="3200400" lvl="6" indent="-304800">
+              <a:spcBef>
+                <a:spcPts val="1600"/>
+              </a:spcBef>
+              <a:spcAft>
+                <a:spcPts val="0"/>
+              </a:spcAft>
               <a:buSzPts val="1200"/>
               <a:buChar char="●"/>
               <a:defRPr sz="1200"/>
             </a:lvl7pPr>
-            <a:lvl8pPr lvl="7">
-              <a:spcBef>
-                <a:spcPts val="0"/>
-              </a:spcBef>
+            <a:lvl8pPr marL="3657600" lvl="7" indent="-304800">
+              <a:spcBef>
+                <a:spcPts val="1600"/>
+              </a:spcBef>
+              <a:spcAft>
+                <a:spcPts val="0"/>
+              </a:spcAft>
               <a:buSzPts val="1200"/>
               <a:buChar char="○"/>
               <a:defRPr sz="1200"/>
             </a:lvl8pPr>
-            <a:lvl9pPr lvl="8">
-              <a:spcBef>
-                <a:spcPts val="0"/>
-              </a:spcBef>
+            <a:lvl9pPr marL="4114800" lvl="8" indent="-304800">
+              <a:spcBef>
+                <a:spcPts val="1600"/>
+              </a:spcBef>
+              <a:spcAft>
+                <a:spcPts val="1600"/>
+              </a:spcAft>
               <a:buSzPts val="1200"/>
               <a:buChar char="■"/>
               <a:defRPr sz="1200"/>
@@ -4435,13 +4873,16 @@
               <a:spcBef>
                 <a:spcPts val="0"/>
               </a:spcBef>
+              <a:spcAft>
+                <a:spcPts val="0"/>
+              </a:spcAft>
               <a:buNone/>
             </a:pPr>
             <a:fld id="{00000000-1234-1234-1234-123412341234}" type="slidenum">
               <a:rPr lang="en"/>
               <a:t>‹#›</a:t>
             </a:fld>
-            <a:endParaRPr lang="en"/>
+            <a:endParaRPr/>
           </a:p>
         </p:txBody>
       </p:sp>
@@ -4509,6 +4950,9 @@
               <a:spcBef>
                 <a:spcPts val="0"/>
               </a:spcBef>
+              <a:spcAft>
+                <a:spcPts val="0"/>
+              </a:spcAft>
               <a:buNone/>
             </a:pPr>
             <a:endParaRPr/>
@@ -4546,6 +4990,9 @@
               <a:spcBef>
                 <a:spcPts val="0"/>
               </a:spcBef>
+              <a:spcAft>
+                <a:spcPts val="0"/>
+              </a:spcAft>
               <a:buNone/>
             </a:pPr>
             <a:endParaRPr/>
@@ -4578,6 +5025,9 @@
               <a:spcBef>
                 <a:spcPts val="0"/>
               </a:spcBef>
+              <a:spcAft>
+                <a:spcPts val="0"/>
+              </a:spcAft>
               <a:buSzPts val="4200"/>
               <a:buNone/>
               <a:defRPr sz="4200"/>
@@ -4586,6 +5036,9 @@
               <a:spcBef>
                 <a:spcPts val="0"/>
               </a:spcBef>
+              <a:spcAft>
+                <a:spcPts val="0"/>
+              </a:spcAft>
               <a:buSzPts val="4200"/>
               <a:buNone/>
               <a:defRPr sz="4200"/>
@@ -4594,6 +5047,9 @@
               <a:spcBef>
                 <a:spcPts val="0"/>
               </a:spcBef>
+              <a:spcAft>
+                <a:spcPts val="0"/>
+              </a:spcAft>
               <a:buSzPts val="4200"/>
               <a:buNone/>
               <a:defRPr sz="4200"/>
@@ -4602,6 +5058,9 @@
               <a:spcBef>
                 <a:spcPts val="0"/>
               </a:spcBef>
+              <a:spcAft>
+                <a:spcPts val="0"/>
+              </a:spcAft>
               <a:buSzPts val="4200"/>
               <a:buNone/>
               <a:defRPr sz="4200"/>
@@ -4610,6 +5069,9 @@
               <a:spcBef>
                 <a:spcPts val="0"/>
               </a:spcBef>
+              <a:spcAft>
+                <a:spcPts val="0"/>
+              </a:spcAft>
               <a:buSzPts val="4200"/>
               <a:buNone/>
               <a:defRPr sz="4200"/>
@@ -4618,6 +5080,9 @@
               <a:spcBef>
                 <a:spcPts val="0"/>
               </a:spcBef>
+              <a:spcAft>
+                <a:spcPts val="0"/>
+              </a:spcAft>
               <a:buSzPts val="4200"/>
               <a:buNone/>
               <a:defRPr sz="4200"/>
@@ -4626,6 +5091,9 @@
               <a:spcBef>
                 <a:spcPts val="0"/>
               </a:spcBef>
+              <a:spcAft>
+                <a:spcPts val="0"/>
+              </a:spcAft>
               <a:buSzPts val="4200"/>
               <a:buNone/>
               <a:defRPr sz="4200"/>
@@ -4634,6 +5102,9 @@
               <a:spcBef>
                 <a:spcPts val="0"/>
               </a:spcBef>
+              <a:spcAft>
+                <a:spcPts val="0"/>
+              </a:spcAft>
               <a:buSzPts val="4200"/>
               <a:buNone/>
               <a:defRPr sz="4200"/>
@@ -4642,6 +5113,9 @@
               <a:spcBef>
                 <a:spcPts val="0"/>
               </a:spcBef>
+              <a:spcAft>
+                <a:spcPts val="0"/>
+              </a:spcAft>
               <a:buSzPts val="4200"/>
               <a:buNone/>
               <a:defRPr sz="4200"/>
@@ -4681,13 +5155,16 @@
               <a:spcBef>
                 <a:spcPts val="0"/>
               </a:spcBef>
+              <a:spcAft>
+                <a:spcPts val="0"/>
+              </a:spcAft>
               <a:buNone/>
             </a:pPr>
             <a:fld id="{00000000-1234-1234-1234-123412341234}" type="slidenum">
               <a:rPr lang="en"/>
               <a:t>‹#›</a:t>
             </a:fld>
-            <a:endParaRPr lang="en"/>
+            <a:endParaRPr/>
           </a:p>
         </p:txBody>
       </p:sp>
@@ -4755,6 +5232,9 @@
               <a:spcBef>
                 <a:spcPts val="0"/>
               </a:spcBef>
+              <a:spcAft>
+                <a:spcPts val="0"/>
+              </a:spcAft>
               <a:buNone/>
             </a:pPr>
             <a:endParaRPr/>
@@ -4813,6 +5293,9 @@
               <a:spcBef>
                 <a:spcPts val="0"/>
               </a:spcBef>
+              <a:spcAft>
+                <a:spcPts val="0"/>
+              </a:spcAft>
               <a:buSzPts val="4200"/>
               <a:buNone/>
               <a:defRPr sz="4200"/>
@@ -4821,6 +5304,9 @@
               <a:spcBef>
                 <a:spcPts val="0"/>
               </a:spcBef>
+              <a:spcAft>
+                <a:spcPts val="0"/>
+              </a:spcAft>
               <a:buSzPts val="4200"/>
               <a:buNone/>
               <a:defRPr sz="4200"/>
@@ -4829,6 +5315,9 @@
               <a:spcBef>
                 <a:spcPts val="0"/>
               </a:spcBef>
+              <a:spcAft>
+                <a:spcPts val="0"/>
+              </a:spcAft>
               <a:buSzPts val="4200"/>
               <a:buNone/>
               <a:defRPr sz="4200"/>
@@ -4837,6 +5326,9 @@
               <a:spcBef>
                 <a:spcPts val="0"/>
               </a:spcBef>
+              <a:spcAft>
+                <a:spcPts val="0"/>
+              </a:spcAft>
               <a:buSzPts val="4200"/>
               <a:buNone/>
               <a:defRPr sz="4200"/>
@@ -4845,6 +5337,9 @@
               <a:spcBef>
                 <a:spcPts val="0"/>
               </a:spcBef>
+              <a:spcAft>
+                <a:spcPts val="0"/>
+              </a:spcAft>
               <a:buSzPts val="4200"/>
               <a:buNone/>
               <a:defRPr sz="4200"/>
@@ -4853,6 +5348,9 @@
               <a:spcBef>
                 <a:spcPts val="0"/>
               </a:spcBef>
+              <a:spcAft>
+                <a:spcPts val="0"/>
+              </a:spcAft>
               <a:buSzPts val="4200"/>
               <a:buNone/>
               <a:defRPr sz="4200"/>
@@ -4861,6 +5359,9 @@
               <a:spcBef>
                 <a:spcPts val="0"/>
               </a:spcBef>
+              <a:spcAft>
+                <a:spcPts val="0"/>
+              </a:spcAft>
               <a:buSzPts val="4200"/>
               <a:buNone/>
               <a:defRPr sz="4200"/>
@@ -4869,6 +5370,9 @@
               <a:spcBef>
                 <a:spcPts val="0"/>
               </a:spcBef>
+              <a:spcAft>
+                <a:spcPts val="0"/>
+              </a:spcAft>
               <a:buSzPts val="4200"/>
               <a:buNone/>
               <a:defRPr sz="4200"/>
@@ -4877,6 +5381,9 @@
               <a:spcBef>
                 <a:spcPts val="0"/>
               </a:spcBef>
+              <a:spcAft>
+                <a:spcPts val="0"/>
+              </a:spcAft>
               <a:buSzPts val="4200"/>
               <a:buNone/>
               <a:defRPr sz="4200"/>
@@ -5126,10 +5633,13 @@
         <p:txBody>
           <a:bodyPr wrap="square" lIns="91425" tIns="91425" rIns="91425" bIns="91425" anchor="ctr" anchorCtr="0"/>
           <a:lstStyle>
-            <a:lvl1pPr lvl="0">
-              <a:spcBef>
-                <a:spcPts val="0"/>
-              </a:spcBef>
+            <a:lvl1pPr marL="457200" lvl="0" indent="-342900">
+              <a:spcBef>
+                <a:spcPts val="0"/>
+              </a:spcBef>
+              <a:spcAft>
+                <a:spcPts val="0"/>
+              </a:spcAft>
               <a:buClr>
                 <a:schemeClr val="accent1"/>
               </a:buClr>
@@ -5141,10 +5651,13 @@
                 </a:solidFill>
               </a:defRPr>
             </a:lvl1pPr>
-            <a:lvl2pPr lvl="1">
-              <a:spcBef>
-                <a:spcPts val="0"/>
-              </a:spcBef>
+            <a:lvl2pPr marL="914400" lvl="1" indent="-317500">
+              <a:spcBef>
+                <a:spcPts val="1600"/>
+              </a:spcBef>
+              <a:spcAft>
+                <a:spcPts val="0"/>
+              </a:spcAft>
               <a:buClr>
                 <a:schemeClr val="accent1"/>
               </a:buClr>
@@ -5156,10 +5669,13 @@
                 </a:solidFill>
               </a:defRPr>
             </a:lvl2pPr>
-            <a:lvl3pPr lvl="2">
-              <a:spcBef>
-                <a:spcPts val="0"/>
-              </a:spcBef>
+            <a:lvl3pPr marL="1371600" lvl="2" indent="-317500">
+              <a:spcBef>
+                <a:spcPts val="1600"/>
+              </a:spcBef>
+              <a:spcAft>
+                <a:spcPts val="0"/>
+              </a:spcAft>
               <a:buClr>
                 <a:schemeClr val="accent1"/>
               </a:buClr>
@@ -5171,10 +5687,13 @@
                 </a:solidFill>
               </a:defRPr>
             </a:lvl3pPr>
-            <a:lvl4pPr lvl="3">
-              <a:spcBef>
-                <a:spcPts val="0"/>
-              </a:spcBef>
+            <a:lvl4pPr marL="1828800" lvl="3" indent="-317500">
+              <a:spcBef>
+                <a:spcPts val="1600"/>
+              </a:spcBef>
+              <a:spcAft>
+                <a:spcPts val="0"/>
+              </a:spcAft>
               <a:buClr>
                 <a:schemeClr val="accent1"/>
               </a:buClr>
@@ -5186,10 +5705,13 @@
                 </a:solidFill>
               </a:defRPr>
             </a:lvl4pPr>
-            <a:lvl5pPr lvl="4">
-              <a:spcBef>
-                <a:spcPts val="0"/>
-              </a:spcBef>
+            <a:lvl5pPr marL="2286000" lvl="4" indent="-317500">
+              <a:spcBef>
+                <a:spcPts val="1600"/>
+              </a:spcBef>
+              <a:spcAft>
+                <a:spcPts val="0"/>
+              </a:spcAft>
               <a:buClr>
                 <a:schemeClr val="accent1"/>
               </a:buClr>
@@ -5201,10 +5723,13 @@
                 </a:solidFill>
               </a:defRPr>
             </a:lvl5pPr>
-            <a:lvl6pPr lvl="5">
-              <a:spcBef>
-                <a:spcPts val="0"/>
-              </a:spcBef>
+            <a:lvl6pPr marL="2743200" lvl="5" indent="-317500">
+              <a:spcBef>
+                <a:spcPts val="1600"/>
+              </a:spcBef>
+              <a:spcAft>
+                <a:spcPts val="0"/>
+              </a:spcAft>
               <a:buClr>
                 <a:schemeClr val="accent1"/>
               </a:buClr>
@@ -5216,10 +5741,13 @@
                 </a:solidFill>
               </a:defRPr>
             </a:lvl6pPr>
-            <a:lvl7pPr lvl="6">
-              <a:spcBef>
-                <a:spcPts val="0"/>
-              </a:spcBef>
+            <a:lvl7pPr marL="3200400" lvl="6" indent="-317500">
+              <a:spcBef>
+                <a:spcPts val="1600"/>
+              </a:spcBef>
+              <a:spcAft>
+                <a:spcPts val="0"/>
+              </a:spcAft>
               <a:buClr>
                 <a:schemeClr val="accent1"/>
               </a:buClr>
@@ -5231,10 +5759,13 @@
                 </a:solidFill>
               </a:defRPr>
             </a:lvl7pPr>
-            <a:lvl8pPr lvl="7">
-              <a:spcBef>
-                <a:spcPts val="0"/>
-              </a:spcBef>
+            <a:lvl8pPr marL="3657600" lvl="7" indent="-317500">
+              <a:spcBef>
+                <a:spcPts val="1600"/>
+              </a:spcBef>
+              <a:spcAft>
+                <a:spcPts val="0"/>
+              </a:spcAft>
               <a:buClr>
                 <a:schemeClr val="accent1"/>
               </a:buClr>
@@ -5246,10 +5777,13 @@
                 </a:solidFill>
               </a:defRPr>
             </a:lvl8pPr>
-            <a:lvl9pPr lvl="8">
-              <a:spcBef>
-                <a:spcPts val="0"/>
-              </a:spcBef>
+            <a:lvl9pPr marL="4114800" lvl="8" indent="-317500">
+              <a:spcBef>
+                <a:spcPts val="1600"/>
+              </a:spcBef>
+              <a:spcAft>
+                <a:spcPts val="1600"/>
+              </a:spcAft>
               <a:buClr>
                 <a:schemeClr val="accent1"/>
               </a:buClr>
@@ -5296,6 +5830,9 @@
               <a:spcBef>
                 <a:spcPts val="0"/>
               </a:spcBef>
+              <a:spcAft>
+                <a:spcPts val="0"/>
+              </a:spcAft>
               <a:buNone/>
             </a:pPr>
             <a:fld id="{00000000-1234-1234-1234-123412341234}" type="slidenum">
@@ -5306,7 +5843,7 @@
               </a:rPr>
               <a:t>‹#›</a:t>
             </a:fld>
-            <a:endParaRPr lang="en">
+            <a:endParaRPr>
               <a:solidFill>
                 <a:schemeClr val="lt1"/>
               </a:solidFill>
@@ -5369,7 +5906,7 @@
         <p:txBody>
           <a:bodyPr wrap="square" lIns="91425" tIns="91425" rIns="91425" bIns="91425" anchor="ctr" anchorCtr="0"/>
           <a:lstStyle>
-            <a:lvl1pPr lvl="0">
+            <a:lvl1pPr marL="457200" lvl="0" indent="-228600">
               <a:lnSpc>
                 <a:spcPct val="100000"/>
               </a:lnSpc>
@@ -5418,13 +5955,16 @@
               <a:spcBef>
                 <a:spcPts val="0"/>
               </a:spcBef>
+              <a:spcAft>
+                <a:spcPts val="0"/>
+              </a:spcAft>
               <a:buNone/>
             </a:pPr>
             <a:fld id="{00000000-1234-1234-1234-123412341234}" type="slidenum">
               <a:rPr lang="en"/>
               <a:t>‹#›</a:t>
             </a:fld>
-            <a:endParaRPr lang="en"/>
+            <a:endParaRPr/>
           </a:p>
         </p:txBody>
       </p:sp>
@@ -5499,6 +6039,9 @@
               <a:spcBef>
                 <a:spcPts val="0"/>
               </a:spcBef>
+              <a:spcAft>
+                <a:spcPts val="0"/>
+              </a:spcAft>
               <a:buClr>
                 <a:schemeClr val="dk1"/>
               </a:buClr>
@@ -5519,6 +6062,9 @@
               <a:spcBef>
                 <a:spcPts val="0"/>
               </a:spcBef>
+              <a:spcAft>
+                <a:spcPts val="0"/>
+              </a:spcAft>
               <a:buClr>
                 <a:schemeClr val="dk1"/>
               </a:buClr>
@@ -5539,6 +6085,9 @@
               <a:spcBef>
                 <a:spcPts val="0"/>
               </a:spcBef>
+              <a:spcAft>
+                <a:spcPts val="0"/>
+              </a:spcAft>
               <a:buClr>
                 <a:schemeClr val="dk1"/>
               </a:buClr>
@@ -5559,6 +6108,9 @@
               <a:spcBef>
                 <a:spcPts val="0"/>
               </a:spcBef>
+              <a:spcAft>
+                <a:spcPts val="0"/>
+              </a:spcAft>
               <a:buClr>
                 <a:schemeClr val="dk1"/>
               </a:buClr>
@@ -5579,6 +6131,9 @@
               <a:spcBef>
                 <a:spcPts val="0"/>
               </a:spcBef>
+              <a:spcAft>
+                <a:spcPts val="0"/>
+              </a:spcAft>
               <a:buClr>
                 <a:schemeClr val="dk1"/>
               </a:buClr>
@@ -5599,6 +6154,9 @@
               <a:spcBef>
                 <a:spcPts val="0"/>
               </a:spcBef>
+              <a:spcAft>
+                <a:spcPts val="0"/>
+              </a:spcAft>
               <a:buClr>
                 <a:schemeClr val="dk1"/>
               </a:buClr>
@@ -5619,6 +6177,9 @@
               <a:spcBef>
                 <a:spcPts val="0"/>
               </a:spcBef>
+              <a:spcAft>
+                <a:spcPts val="0"/>
+              </a:spcAft>
               <a:buClr>
                 <a:schemeClr val="dk1"/>
               </a:buClr>
@@ -5639,6 +6200,9 @@
               <a:spcBef>
                 <a:spcPts val="0"/>
               </a:spcBef>
+              <a:spcAft>
+                <a:spcPts val="0"/>
+              </a:spcAft>
               <a:buClr>
                 <a:schemeClr val="dk1"/>
               </a:buClr>
@@ -5659,6 +6223,9 @@
               <a:spcBef>
                 <a:spcPts val="0"/>
               </a:spcBef>
+              <a:spcAft>
+                <a:spcPts val="0"/>
+              </a:spcAft>
               <a:buClr>
                 <a:schemeClr val="dk1"/>
               </a:buClr>
@@ -5707,7 +6274,7 @@
         <p:txBody>
           <a:bodyPr wrap="square" lIns="91425" tIns="91425" rIns="91425" bIns="91425" anchor="t" anchorCtr="0"/>
           <a:lstStyle>
-            <a:lvl1pPr lvl="0">
+            <a:lvl1pPr marL="457200" lvl="0" indent="-342900">
               <a:lnSpc>
                 <a:spcPct val="115000"/>
               </a:lnSpc>
@@ -5715,7 +6282,7 @@
                 <a:spcPts val="0"/>
               </a:spcBef>
               <a:spcAft>
-                <a:spcPts val="1600"/>
+                <a:spcPts val="0"/>
               </a:spcAft>
               <a:buClr>
                 <a:schemeClr val="dk1"/>
@@ -5733,15 +6300,15 @@
                 <a:sym typeface="Lato"/>
               </a:defRPr>
             </a:lvl1pPr>
-            <a:lvl2pPr lvl="1">
+            <a:lvl2pPr marL="914400" lvl="1" indent="-317500">
               <a:lnSpc>
                 <a:spcPct val="115000"/>
               </a:lnSpc>
               <a:spcBef>
-                <a:spcPts val="0"/>
-              </a:spcBef>
-              <a:spcAft>
                 <a:spcPts val="1600"/>
+              </a:spcBef>
+              <a:spcAft>
+                <a:spcPts val="0"/>
               </a:spcAft>
               <a:buClr>
                 <a:schemeClr val="dk1"/>
@@ -5759,15 +6326,15 @@
                 <a:sym typeface="Lato"/>
               </a:defRPr>
             </a:lvl2pPr>
-            <a:lvl3pPr lvl="2">
+            <a:lvl3pPr marL="1371600" lvl="2" indent="-317500">
               <a:lnSpc>
                 <a:spcPct val="115000"/>
               </a:lnSpc>
               <a:spcBef>
-                <a:spcPts val="0"/>
-              </a:spcBef>
-              <a:spcAft>
                 <a:spcPts val="1600"/>
+              </a:spcBef>
+              <a:spcAft>
+                <a:spcPts val="0"/>
               </a:spcAft>
               <a:buClr>
                 <a:schemeClr val="dk1"/>
@@ -5785,15 +6352,15 @@
                 <a:sym typeface="Lato"/>
               </a:defRPr>
             </a:lvl3pPr>
-            <a:lvl4pPr lvl="3">
+            <a:lvl4pPr marL="1828800" lvl="3" indent="-317500">
               <a:lnSpc>
                 <a:spcPct val="115000"/>
               </a:lnSpc>
               <a:spcBef>
-                <a:spcPts val="0"/>
-              </a:spcBef>
-              <a:spcAft>
                 <a:spcPts val="1600"/>
+              </a:spcBef>
+              <a:spcAft>
+                <a:spcPts val="0"/>
               </a:spcAft>
               <a:buClr>
                 <a:schemeClr val="dk1"/>
@@ -5811,15 +6378,15 @@
                 <a:sym typeface="Lato"/>
               </a:defRPr>
             </a:lvl4pPr>
-            <a:lvl5pPr lvl="4">
+            <a:lvl5pPr marL="2286000" lvl="4" indent="-317500">
               <a:lnSpc>
                 <a:spcPct val="115000"/>
               </a:lnSpc>
               <a:spcBef>
-                <a:spcPts val="0"/>
-              </a:spcBef>
-              <a:spcAft>
                 <a:spcPts val="1600"/>
+              </a:spcBef>
+              <a:spcAft>
+                <a:spcPts val="0"/>
               </a:spcAft>
               <a:buClr>
                 <a:schemeClr val="dk1"/>
@@ -5837,15 +6404,15 @@
                 <a:sym typeface="Lato"/>
               </a:defRPr>
             </a:lvl5pPr>
-            <a:lvl6pPr lvl="5">
+            <a:lvl6pPr marL="2743200" lvl="5" indent="-317500">
               <a:lnSpc>
                 <a:spcPct val="115000"/>
               </a:lnSpc>
               <a:spcBef>
-                <a:spcPts val="0"/>
-              </a:spcBef>
-              <a:spcAft>
                 <a:spcPts val="1600"/>
+              </a:spcBef>
+              <a:spcAft>
+                <a:spcPts val="0"/>
               </a:spcAft>
               <a:buClr>
                 <a:schemeClr val="dk1"/>
@@ -5863,15 +6430,15 @@
                 <a:sym typeface="Lato"/>
               </a:defRPr>
             </a:lvl6pPr>
-            <a:lvl7pPr lvl="6">
+            <a:lvl7pPr marL="3200400" lvl="6" indent="-317500">
               <a:lnSpc>
                 <a:spcPct val="115000"/>
               </a:lnSpc>
               <a:spcBef>
-                <a:spcPts val="0"/>
-              </a:spcBef>
-              <a:spcAft>
                 <a:spcPts val="1600"/>
+              </a:spcBef>
+              <a:spcAft>
+                <a:spcPts val="0"/>
               </a:spcAft>
               <a:buClr>
                 <a:schemeClr val="dk1"/>
@@ -5889,15 +6456,15 @@
                 <a:sym typeface="Lato"/>
               </a:defRPr>
             </a:lvl7pPr>
-            <a:lvl8pPr lvl="7">
+            <a:lvl8pPr marL="3657600" lvl="7" indent="-317500">
               <a:lnSpc>
                 <a:spcPct val="115000"/>
               </a:lnSpc>
               <a:spcBef>
-                <a:spcPts val="0"/>
-              </a:spcBef>
-              <a:spcAft>
                 <a:spcPts val="1600"/>
+              </a:spcBef>
+              <a:spcAft>
+                <a:spcPts val="0"/>
               </a:spcAft>
               <a:buClr>
                 <a:schemeClr val="dk1"/>
@@ -5915,12 +6482,12 @@
                 <a:sym typeface="Lato"/>
               </a:defRPr>
             </a:lvl8pPr>
-            <a:lvl9pPr lvl="8">
+            <a:lvl9pPr marL="4114800" lvl="8" indent="-317500">
               <a:lnSpc>
                 <a:spcPct val="115000"/>
               </a:lnSpc>
               <a:spcBef>
-                <a:spcPts val="0"/>
+                <a:spcPts val="1600"/>
               </a:spcBef>
               <a:spcAft>
                 <a:spcPts val="1600"/>
@@ -5980,6 +6547,9 @@
               <a:spcBef>
                 <a:spcPts val="0"/>
               </a:spcBef>
+              <a:spcAft>
+                <a:spcPts val="0"/>
+              </a:spcAft>
               <a:buNone/>
             </a:pPr>
             <a:fld id="{00000000-1234-1234-1234-123412341234}" type="slidenum">
@@ -5994,7 +6564,7 @@
               </a:rPr>
               <a:t>‹#›</a:t>
             </a:fld>
-            <a:endParaRPr lang="en" sz="1000">
+            <a:endParaRPr sz="1000">
               <a:solidFill>
                 <a:schemeClr val="dk1"/>
               </a:solidFill>
@@ -6520,30 +7090,41 @@
               <a:spcBef>
                 <a:spcPts val="0"/>
               </a:spcBef>
+              <a:spcAft>
+                <a:spcPts val="0"/>
+              </a:spcAft>
               <a:buNone/>
             </a:pPr>
             <a:r>
               <a:rPr lang="en" sz="4800"/>
               <a:t>Wi-Fi: </a:t>
             </a:r>
+            <a:endParaRPr sz="4800"/>
           </a:p>
           <a:p>
             <a:pPr marL="0" lvl="0" indent="0">
               <a:spcBef>
                 <a:spcPts val="0"/>
               </a:spcBef>
+              <a:spcAft>
+                <a:spcPts val="0"/>
+              </a:spcAft>
               <a:buNone/>
             </a:pPr>
             <a:r>
               <a:rPr lang="en" sz="4800"/>
               <a:t>Starspace 46 guest</a:t>
             </a:r>
+            <a:endParaRPr sz="4800"/>
           </a:p>
           <a:p>
             <a:pPr marL="0" lvl="0" indent="0" rtl="0">
               <a:spcBef>
                 <a:spcPts val="0"/>
               </a:spcBef>
+              <a:spcAft>
+                <a:spcPts val="0"/>
+              </a:spcAft>
               <a:buNone/>
             </a:pPr>
             <a:endParaRPr sz="4800"/>
@@ -6553,24 +7134,32 @@
               <a:spcBef>
                 <a:spcPts val="0"/>
               </a:spcBef>
+              <a:spcAft>
+                <a:spcPts val="0"/>
+              </a:spcAft>
               <a:buNone/>
             </a:pPr>
             <a:r>
               <a:rPr lang="en" sz="4800"/>
               <a:t>Password: </a:t>
             </a:r>
+            <a:endParaRPr sz="4800"/>
           </a:p>
           <a:p>
             <a:pPr marL="0" lvl="0" indent="0" rtl="0">
               <a:spcBef>
                 <a:spcPts val="0"/>
               </a:spcBef>
+              <a:spcAft>
+                <a:spcPts val="0"/>
+              </a:spcAft>
               <a:buNone/>
             </a:pPr>
             <a:r>
               <a:rPr lang="en" sz="4800"/>
               <a:t>Techlahoma</a:t>
             </a:r>
+            <a:endParaRPr sz="4800"/>
           </a:p>
         </p:txBody>
       </p:sp>
@@ -6636,12 +7225,16 @@
               <a:spcBef>
                 <a:spcPts val="0"/>
               </a:spcBef>
+              <a:spcAft>
+                <a:spcPts val="0"/>
+              </a:spcAft>
               <a:buNone/>
             </a:pPr>
             <a:r>
               <a:rPr lang="en" sz="4800"/>
               <a:t>OKC Ruby</a:t>
             </a:r>
+            <a:endParaRPr sz="4800" b="0"/>
           </a:p>
         </p:txBody>
       </p:sp>
@@ -6678,7 +7271,7 @@
                 <a:spcPts val="0"/>
               </a:spcBef>
               <a:spcAft>
-                <a:spcPts val="1600"/>
+                <a:spcPts val="0"/>
               </a:spcAft>
               <a:buNone/>
             </a:pPr>
@@ -6686,12 +7279,16 @@
               <a:rPr lang="en" sz="3600"/>
               <a:t>Thursday 1/11</a:t>
             </a:r>
-          </a:p>
-          <a:p>
-            <a:pPr marL="0" lvl="0" indent="-69850" rtl="0">
-              <a:spcBef>
-                <a:spcPts val="0"/>
-              </a:spcBef>
+            <a:endParaRPr sz="3600"/>
+          </a:p>
+          <a:p>
+            <a:pPr marL="0" lvl="0" indent="0">
+              <a:spcBef>
+                <a:spcPts val="0"/>
+              </a:spcBef>
+              <a:spcAft>
+                <a:spcPts val="0"/>
+              </a:spcAft>
               <a:buClr>
                 <a:schemeClr val="dk2"/>
               </a:buClr>
@@ -6703,6 +7300,28 @@
               <a:rPr lang="en" sz="3600"/>
               <a:t>11:30 - 12:30</a:t>
             </a:r>
+            <a:endParaRPr sz="3600"/>
+          </a:p>
+          <a:p>
+            <a:pPr marL="0" lvl="0" indent="0" rtl="0">
+              <a:spcBef>
+                <a:spcPts val="0"/>
+              </a:spcBef>
+              <a:spcAft>
+                <a:spcPts val="0"/>
+              </a:spcAft>
+              <a:buClr>
+                <a:schemeClr val="dk2"/>
+              </a:buClr>
+              <a:buSzPts val="1100"/>
+              <a:buFont typeface="Arial"/>
+              <a:buNone/>
+            </a:pPr>
+            <a:r>
+              <a:rPr lang="en" sz="3600"/>
+              <a:t>The Odin Project: Advantages and Drawbacks of the Meta-Tutorial</a:t>
+            </a:r>
+            <a:endParaRPr sz="3600"/>
           </a:p>
           <a:p>
             <a:pPr marL="0" marR="0" lvl="0" indent="0" algn="l" rtl="0">
@@ -6713,7 +7332,7 @@
                 <a:spcPts val="0"/>
               </a:spcBef>
               <a:spcAft>
-                <a:spcPts val="1600"/>
+                <a:spcPts val="0"/>
               </a:spcAft>
               <a:buNone/>
             </a:pPr>
@@ -6730,6 +7349,7 @@
               <a:rPr lang="en" sz="3600"/>
               <a:t> </a:t>
             </a:r>
+            <a:endParaRPr sz="3600"/>
           </a:p>
         </p:txBody>
       </p:sp>
@@ -6795,12 +7415,16 @@
               <a:spcBef>
                 <a:spcPts val="0"/>
               </a:spcBef>
+              <a:spcAft>
+                <a:spcPts val="0"/>
+              </a:spcAft>
               <a:buNone/>
             </a:pPr>
             <a:r>
               <a:rPr lang="en" sz="4800"/>
               <a:t>OKC Open Source Hardware</a:t>
             </a:r>
+            <a:endParaRPr sz="4800"/>
           </a:p>
         </p:txBody>
       </p:sp>
@@ -6842,9 +7466,10 @@
               <a:rPr lang="en" sz="3600"/>
               <a:t>Saturday 1/13</a:t>
             </a:r>
-          </a:p>
-          <a:p>
-            <a:pPr marL="0" lvl="0" indent="-69850">
+            <a:endParaRPr sz="3600"/>
+          </a:p>
+          <a:p>
+            <a:pPr marL="0" lvl="0" indent="0">
               <a:spcBef>
                 <a:spcPts val="0"/>
               </a:spcBef>
@@ -6862,9 +7487,10 @@
               <a:rPr lang="en" sz="3600"/>
               <a:t>2:00 - 4:00 pm</a:t>
             </a:r>
-          </a:p>
-          <a:p>
-            <a:pPr marL="0" lvl="0" indent="-69850" rtl="0">
+            <a:endParaRPr sz="3600"/>
+          </a:p>
+          <a:p>
+            <a:pPr marL="0" lvl="0" indent="0" rtl="0">
               <a:spcBef>
                 <a:spcPts val="0"/>
               </a:spcBef>
@@ -6880,8 +7506,30 @@
             </a:pPr>
             <a:r>
               <a:rPr lang="en" sz="3600"/>
-              <a:t>Meet Liger! A FOSS light switch for home automation/security</a:t>
+              <a:t>Meet Liger! A FOSS light switch </a:t>
             </a:r>
+            <a:endParaRPr sz="3600"/>
+          </a:p>
+          <a:p>
+            <a:pPr marL="0" lvl="0" indent="0" rtl="0">
+              <a:spcBef>
+                <a:spcPts val="0"/>
+              </a:spcBef>
+              <a:spcAft>
+                <a:spcPts val="0"/>
+              </a:spcAft>
+              <a:buClr>
+                <a:schemeClr val="dk2"/>
+              </a:buClr>
+              <a:buSzPts val="1100"/>
+              <a:buFont typeface="Arial"/>
+              <a:buNone/>
+            </a:pPr>
+            <a:r>
+              <a:rPr lang="en" sz="3600"/>
+              <a:t>for home automation/security</a:t>
+            </a:r>
+            <a:endParaRPr sz="3600"/>
           </a:p>
           <a:p>
             <a:pPr marL="0" lvl="0" indent="0" rtl="0">
@@ -6906,6 +7554,7 @@
               <a:rPr lang="en" sz="3600"/>
               <a:t> </a:t>
             </a:r>
+            <a:endParaRPr sz="3600"/>
           </a:p>
         </p:txBody>
       </p:sp>
@@ -6971,12 +7620,16 @@
               <a:spcBef>
                 <a:spcPts val="0"/>
               </a:spcBef>
+              <a:spcAft>
+                <a:spcPts val="0"/>
+              </a:spcAft>
               <a:buNone/>
             </a:pPr>
             <a:r>
               <a:rPr lang="en" sz="4800"/>
               <a:t>Free Code Camp OKC</a:t>
             </a:r>
+            <a:endParaRPr sz="4800"/>
           </a:p>
         </p:txBody>
       </p:sp>
@@ -7009,18 +7662,25 @@
               <a:spcBef>
                 <a:spcPts val="0"/>
               </a:spcBef>
+              <a:spcAft>
+                <a:spcPts val="0"/>
+              </a:spcAft>
               <a:buNone/>
             </a:pPr>
             <a:r>
               <a:rPr lang="en" sz="3600"/>
               <a:t>Sunday 1/14</a:t>
             </a:r>
-          </a:p>
-          <a:p>
-            <a:pPr marL="0" lvl="0" indent="-69850">
-              <a:spcBef>
-                <a:spcPts val="0"/>
-              </a:spcBef>
+            <a:endParaRPr sz="3600"/>
+          </a:p>
+          <a:p>
+            <a:pPr marL="0" lvl="0" indent="0">
+              <a:spcBef>
+                <a:spcPts val="1600"/>
+              </a:spcBef>
+              <a:spcAft>
+                <a:spcPts val="0"/>
+              </a:spcAft>
               <a:buClr>
                 <a:schemeClr val="dk2"/>
               </a:buClr>
@@ -7032,12 +7692,16 @@
               <a:rPr lang="en" sz="3600"/>
               <a:t>2:00 - 3:00 pm</a:t>
             </a:r>
-          </a:p>
-          <a:p>
-            <a:pPr marL="0" lvl="0" indent="-69850" rtl="0">
-              <a:spcBef>
-                <a:spcPts val="0"/>
-              </a:spcBef>
+            <a:endParaRPr sz="3600"/>
+          </a:p>
+          <a:p>
+            <a:pPr marL="0" lvl="0" indent="0" rtl="0">
+              <a:spcBef>
+                <a:spcPts val="1600"/>
+              </a:spcBef>
+              <a:spcAft>
+                <a:spcPts val="0"/>
+              </a:spcAft>
               <a:buClr>
                 <a:schemeClr val="dk2"/>
               </a:buClr>
@@ -7049,12 +7713,16 @@
               <a:rPr lang="en" sz="3600"/>
               <a:t>Intro to APIs</a:t>
             </a:r>
+            <a:endParaRPr sz="3600"/>
           </a:p>
           <a:p>
             <a:pPr marL="0" lvl="0" indent="0" rtl="0">
               <a:spcBef>
-                <a:spcPts val="0"/>
-              </a:spcBef>
+                <a:spcPts val="1600"/>
+              </a:spcBef>
+              <a:spcAft>
+                <a:spcPts val="1600"/>
+              </a:spcAft>
               <a:buNone/>
             </a:pPr>
             <a:r>
@@ -7070,6 +7738,7 @@
               <a:rPr lang="en" sz="3600"/>
               <a:t> </a:t>
             </a:r>
+            <a:endParaRPr sz="3600"/>
           </a:p>
         </p:txBody>
       </p:sp>
@@ -7135,12 +7804,16 @@
               <a:spcBef>
                 <a:spcPts val="0"/>
               </a:spcBef>
+              <a:spcAft>
+                <a:spcPts val="0"/>
+              </a:spcAft>
               <a:buNone/>
             </a:pPr>
             <a:r>
               <a:rPr lang="en" sz="4800"/>
               <a:t>OKC Python February Meetup</a:t>
             </a:r>
+            <a:endParaRPr sz="4800"/>
           </a:p>
         </p:txBody>
       </p:sp>
@@ -7173,18 +7846,25 @@
               <a:spcBef>
                 <a:spcPts val="0"/>
               </a:spcBef>
+              <a:spcAft>
+                <a:spcPts val="0"/>
+              </a:spcAft>
               <a:buNone/>
             </a:pPr>
             <a:r>
               <a:rPr lang="en" sz="3600"/>
               <a:t>Wednesday 2/14</a:t>
             </a:r>
-          </a:p>
-          <a:p>
-            <a:pPr marL="0" lvl="0" indent="-69850">
-              <a:spcBef>
-                <a:spcPts val="0"/>
-              </a:spcBef>
+            <a:endParaRPr sz="3600"/>
+          </a:p>
+          <a:p>
+            <a:pPr marL="0" lvl="0" indent="0">
+              <a:spcBef>
+                <a:spcPts val="1600"/>
+              </a:spcBef>
+              <a:spcAft>
+                <a:spcPts val="0"/>
+              </a:spcAft>
               <a:buClr>
                 <a:schemeClr val="dk2"/>
               </a:buClr>
@@ -7196,24 +7876,32 @@
               <a:rPr lang="en" sz="3600"/>
               <a:t>11:30 - 12:30</a:t>
             </a:r>
+            <a:endParaRPr sz="3600"/>
           </a:p>
           <a:p>
             <a:pPr marL="0" lvl="0" indent="0" rtl="0">
               <a:spcBef>
-                <a:spcPts val="0"/>
-              </a:spcBef>
+                <a:spcPts val="1600"/>
+              </a:spcBef>
+              <a:spcAft>
+                <a:spcPts val="0"/>
+              </a:spcAft>
               <a:buNone/>
             </a:pPr>
             <a:r>
               <a:rPr lang="en" sz="3600"/>
-              <a:t>Speaker: Jess Hale (OKC Analytics group)</a:t>
+              <a:t>Using Python for Analytics (Jess Hale)</a:t>
             </a:r>
+            <a:endParaRPr sz="3600"/>
           </a:p>
           <a:p>
             <a:pPr marL="0" lvl="0" indent="0" rtl="0">
               <a:spcBef>
-                <a:spcPts val="0"/>
-              </a:spcBef>
+                <a:spcPts val="1600"/>
+              </a:spcBef>
+              <a:spcAft>
+                <a:spcPts val="1600"/>
+              </a:spcAft>
               <a:buNone/>
             </a:pPr>
             <a:r>
@@ -7229,6 +7917,7 @@
               <a:rPr lang="en" sz="3600"/>
               <a:t> </a:t>
             </a:r>
+            <a:endParaRPr sz="3600"/>
           </a:p>
         </p:txBody>
       </p:sp>
@@ -7294,12 +7983,16 @@
               <a:spcBef>
                 <a:spcPts val="0"/>
               </a:spcBef>
+              <a:spcAft>
+                <a:spcPts val="0"/>
+              </a:spcAft>
               <a:buNone/>
             </a:pPr>
             <a:r>
               <a:rPr lang="en" sz="4800"/>
               <a:t>OKC Python March Meetup</a:t>
             </a:r>
+            <a:endParaRPr sz="4800"/>
           </a:p>
         </p:txBody>
       </p:sp>
@@ -7332,18 +8025,25 @@
               <a:spcBef>
                 <a:spcPts val="0"/>
               </a:spcBef>
+              <a:spcAft>
+                <a:spcPts val="0"/>
+              </a:spcAft>
               <a:buNone/>
             </a:pPr>
             <a:r>
               <a:rPr lang="en" sz="3600"/>
               <a:t>Wednesday 3/14</a:t>
             </a:r>
-          </a:p>
-          <a:p>
-            <a:pPr marL="0" lvl="0" indent="-69850" rtl="0">
-              <a:spcBef>
-                <a:spcPts val="0"/>
-              </a:spcBef>
+            <a:endParaRPr sz="3600"/>
+          </a:p>
+          <a:p>
+            <a:pPr marL="0" lvl="0" indent="0" rtl="0">
+              <a:spcBef>
+                <a:spcPts val="1600"/>
+              </a:spcBef>
+              <a:spcAft>
+                <a:spcPts val="0"/>
+              </a:spcAft>
               <a:buClr>
                 <a:schemeClr val="dk2"/>
               </a:buClr>
@@ -7355,24 +8055,32 @@
               <a:rPr lang="en" sz="3600"/>
               <a:t>11:30 - 12:30</a:t>
             </a:r>
+            <a:endParaRPr sz="3600"/>
           </a:p>
           <a:p>
             <a:pPr marL="0" lvl="0" indent="0" rtl="0">
               <a:spcBef>
-                <a:spcPts val="0"/>
-              </a:spcBef>
+                <a:spcPts val="1600"/>
+              </a:spcBef>
+              <a:spcAft>
+                <a:spcPts val="0"/>
+              </a:spcAft>
               <a:buNone/>
             </a:pPr>
             <a:r>
               <a:rPr lang="en" sz="3600"/>
               <a:t>Speaker: You?</a:t>
             </a:r>
+            <a:endParaRPr sz="3600"/>
           </a:p>
           <a:p>
             <a:pPr marL="0" lvl="0" indent="0" rtl="0">
               <a:spcBef>
-                <a:spcPts val="0"/>
-              </a:spcBef>
+                <a:spcPts val="1600"/>
+              </a:spcBef>
+              <a:spcAft>
+                <a:spcPts val="1600"/>
+              </a:spcAft>
               <a:buNone/>
             </a:pPr>
             <a:r>
@@ -7388,6 +8096,7 @@
               <a:rPr lang="en" sz="3600"/>
               <a:t> </a:t>
             </a:r>
+            <a:endParaRPr sz="3600"/>
           </a:p>
         </p:txBody>
       </p:sp>
@@ -7449,10 +8158,13 @@
           </a:bodyPr>
           <a:lstStyle/>
           <a:p>
-            <a:pPr marL="0" lvl="0" indent="-69850">
-              <a:spcBef>
-                <a:spcPts val="0"/>
-              </a:spcBef>
+            <a:pPr marL="0" lvl="0" indent="0">
+              <a:spcBef>
+                <a:spcPts val="0"/>
+              </a:spcBef>
+              <a:spcAft>
+                <a:spcPts val="0"/>
+              </a:spcAft>
               <a:buClr>
                 <a:schemeClr val="dk2"/>
               </a:buClr>
@@ -7464,12 +8176,16 @@
               <a:rPr lang="en" sz="4800"/>
               <a:t>Topic Suggestions:</a:t>
             </a:r>
+            <a:endParaRPr sz="4800"/>
           </a:p>
           <a:p>
             <a:pPr marL="0" lvl="0" indent="0" rtl="0">
               <a:spcBef>
                 <a:spcPts val="0"/>
               </a:spcBef>
+              <a:spcAft>
+                <a:spcPts val="0"/>
+              </a:spcAft>
               <a:buNone/>
             </a:pPr>
             <a:r>
@@ -7485,6 +8201,7 @@
               <a:rPr lang="en" sz="3600"/>
               <a:t> </a:t>
             </a:r>
+            <a:endParaRPr sz="3600"/>
           </a:p>
         </p:txBody>
       </p:sp>
@@ -7550,12 +8267,16 @@
               <a:spcBef>
                 <a:spcPts val="0"/>
               </a:spcBef>
+              <a:spcAft>
+                <a:spcPts val="0"/>
+              </a:spcAft>
               <a:buNone/>
             </a:pPr>
             <a:r>
               <a:rPr lang="en"/>
               <a:t>OKC Python</a:t>
             </a:r>
+            <a:endParaRPr/>
           </a:p>
         </p:txBody>
       </p:sp>
@@ -7588,10 +8309,13 @@
               <a:spcBef>
                 <a:spcPts val="0"/>
               </a:spcBef>
+              <a:spcAft>
+                <a:spcPts val="0"/>
+              </a:spcAft>
               <a:buNone/>
             </a:pPr>
             <a:r>
-              <a:rPr lang="en" u="sng">
+              <a:rPr lang="en" sz="4800" u="sng">
                 <a:solidFill>
                   <a:schemeClr val="hlink"/>
                 </a:solidFill>
@@ -7600,19 +8324,23 @@
               <a:t>meetup.com/okcpython</a:t>
             </a:r>
             <a:r>
-              <a:rPr lang="en"/>
+              <a:rPr lang="en" sz="4800"/>
               <a:t> </a:t>
             </a:r>
+            <a:endParaRPr sz="4800"/>
           </a:p>
           <a:p>
             <a:pPr marL="0" lvl="0" indent="0">
               <a:spcBef>
-                <a:spcPts val="0"/>
-              </a:spcBef>
+                <a:spcPts val="1600"/>
+              </a:spcBef>
+              <a:spcAft>
+                <a:spcPts val="1600"/>
+              </a:spcAft>
               <a:buNone/>
             </a:pPr>
             <a:r>
-              <a:rPr lang="en" u="sng">
+              <a:rPr lang="en" sz="4800" u="sng">
                 <a:solidFill>
                   <a:schemeClr val="hlink"/>
                 </a:solidFill>
@@ -7621,9 +8349,10 @@
               <a:t>twitter.com/okcpython</a:t>
             </a:r>
             <a:r>
-              <a:rPr lang="en"/>
+              <a:rPr lang="en" sz="4800"/>
               <a:t> </a:t>
             </a:r>
+            <a:endParaRPr sz="4800"/>
           </a:p>
         </p:txBody>
       </p:sp>
@@ -7689,24 +8418,32 @@
               <a:spcBef>
                 <a:spcPts val="0"/>
               </a:spcBef>
+              <a:spcAft>
+                <a:spcPts val="0"/>
+              </a:spcAft>
               <a:buNone/>
             </a:pPr>
             <a:r>
               <a:rPr lang="en" sz="4000"/>
               <a:t>Thanks for joining us today! </a:t>
             </a:r>
+            <a:endParaRPr sz="4000"/>
           </a:p>
           <a:p>
             <a:pPr marL="0" lvl="0" indent="0" rtl="0">
               <a:spcBef>
                 <a:spcPts val="0"/>
               </a:spcBef>
+              <a:spcAft>
+                <a:spcPts val="0"/>
+              </a:spcAft>
               <a:buNone/>
             </a:pPr>
             <a:r>
               <a:rPr lang="en" sz="4000"/>
               <a:t>We're here thanks to volunteers, speakers, and Techlahoma.</a:t>
             </a:r>
+            <a:endParaRPr sz="4000"/>
           </a:p>
         </p:txBody>
       </p:sp>
@@ -7772,12 +8509,16 @@
               <a:spcBef>
                 <a:spcPts val="0"/>
               </a:spcBef>
+              <a:spcAft>
+                <a:spcPts val="0"/>
+              </a:spcAft>
               <a:buNone/>
             </a:pPr>
             <a:r>
               <a:rPr lang="en" sz="4800"/>
               <a:t>What is Techlahoma?</a:t>
             </a:r>
+            <a:endParaRPr sz="4800" b="0"/>
           </a:p>
         </p:txBody>
       </p:sp>
@@ -7823,6 +8564,7 @@
               <a:rPr lang="en" sz="3600"/>
               <a:t>non-profit volunteer-run organization</a:t>
             </a:r>
+            <a:endParaRPr sz="3600"/>
           </a:p>
           <a:p>
             <a:pPr marL="457200" lvl="0" indent="-457200" rtl="0">
@@ -7842,6 +8584,7 @@
               <a:rPr lang="en" sz="3600"/>
               <a:t>hosts 33 groups and 2 conferences</a:t>
             </a:r>
+            <a:endParaRPr sz="3600"/>
           </a:p>
           <a:p>
             <a:pPr marL="457200" lvl="0" indent="-457200" rtl="0">
@@ -7861,6 +8604,7 @@
               <a:rPr lang="en" sz="3600"/>
               <a:t>sponsors free local events</a:t>
             </a:r>
+            <a:endParaRPr sz="3600"/>
           </a:p>
           <a:p>
             <a:pPr marL="457200" lvl="0" indent="-457200">
@@ -7870,6 +8614,9 @@
               <a:spcBef>
                 <a:spcPts val="0"/>
               </a:spcBef>
+              <a:spcAft>
+                <a:spcPts val="0"/>
+              </a:spcAft>
               <a:buSzPts val="3600"/>
               <a:buChar char="●"/>
             </a:pPr>
@@ -7877,6 +8624,7 @@
               <a:rPr lang="en" sz="3600"/>
               <a:t>supports the grassroots tech community of Oklahoma</a:t>
             </a:r>
+            <a:endParaRPr sz="3600"/>
           </a:p>
         </p:txBody>
       </p:sp>
@@ -7942,12 +8690,16 @@
               <a:spcBef>
                 <a:spcPts val="0"/>
               </a:spcBef>
+              <a:spcAft>
+                <a:spcPts val="0"/>
+              </a:spcAft>
               <a:buNone/>
             </a:pPr>
             <a:r>
               <a:rPr lang="en"/>
               <a:t>Techlahoma.org</a:t>
             </a:r>
+            <a:endParaRPr/>
           </a:p>
         </p:txBody>
       </p:sp>
@@ -7980,6 +8732,9 @@
               <a:spcBef>
                 <a:spcPts val="0"/>
               </a:spcBef>
+              <a:spcAft>
+                <a:spcPts val="0"/>
+              </a:spcAft>
               <a:buNone/>
             </a:pPr>
             <a:r>
@@ -7995,12 +8750,16 @@
               <a:rPr lang="en"/>
               <a:t> </a:t>
             </a:r>
+            <a:endParaRPr/>
           </a:p>
           <a:p>
             <a:pPr marL="0" lvl="0" indent="0">
               <a:spcBef>
-                <a:spcPts val="0"/>
-              </a:spcBef>
+                <a:spcPts val="1600"/>
+              </a:spcBef>
+              <a:spcAft>
+                <a:spcPts val="0"/>
+              </a:spcAft>
               <a:buNone/>
             </a:pPr>
             <a:r>
@@ -8016,12 +8775,16 @@
               <a:rPr lang="en"/>
               <a:t> </a:t>
             </a:r>
+            <a:endParaRPr/>
           </a:p>
           <a:p>
             <a:pPr marL="0" lvl="0" indent="0" rtl="0">
               <a:spcBef>
-                <a:spcPts val="0"/>
-              </a:spcBef>
+                <a:spcPts val="1600"/>
+              </a:spcBef>
+              <a:spcAft>
+                <a:spcPts val="1600"/>
+              </a:spcAft>
               <a:buNone/>
             </a:pPr>
             <a:r>
@@ -8037,6 +8800,7 @@
               <a:rPr lang="en"/>
               <a:t> </a:t>
             </a:r>
+            <a:endParaRPr/>
           </a:p>
         </p:txBody>
       </p:sp>
@@ -8102,6 +8866,9 @@
               <a:spcBef>
                 <a:spcPts val="0"/>
               </a:spcBef>
+              <a:spcAft>
+                <a:spcPts val="0"/>
+              </a:spcAft>
               <a:buNone/>
             </a:pPr>
             <a:endParaRPr/>
@@ -8137,6 +8904,9 @@
               <a:spcBef>
                 <a:spcPts val="0"/>
               </a:spcBef>
+              <a:spcAft>
+                <a:spcPts val="1600"/>
+              </a:spcAft>
               <a:buNone/>
             </a:pPr>
             <a:endParaRPr/>
@@ -8233,12 +9003,16 @@
               <a:spcBef>
                 <a:spcPts val="0"/>
               </a:spcBef>
+              <a:spcAft>
+                <a:spcPts val="0"/>
+              </a:spcAft>
               <a:buNone/>
             </a:pPr>
             <a:r>
               <a:rPr lang="en"/>
               <a:t>StarSpace46.com</a:t>
             </a:r>
+            <a:endParaRPr/>
           </a:p>
         </p:txBody>
       </p:sp>
@@ -8271,6 +9045,9 @@
               <a:spcBef>
                 <a:spcPts val="0"/>
               </a:spcBef>
+              <a:spcAft>
+                <a:spcPts val="0"/>
+              </a:spcAft>
               <a:buNone/>
             </a:pPr>
             <a:r>
@@ -8286,12 +9063,16 @@
               <a:rPr lang="en"/>
               <a:t> </a:t>
             </a:r>
+            <a:endParaRPr/>
           </a:p>
           <a:p>
             <a:pPr marL="0" lvl="0" indent="0">
               <a:spcBef>
-                <a:spcPts val="0"/>
-              </a:spcBef>
+                <a:spcPts val="1600"/>
+              </a:spcBef>
+              <a:spcAft>
+                <a:spcPts val="0"/>
+              </a:spcAft>
               <a:buNone/>
             </a:pPr>
             <a:r>
@@ -8307,18 +9088,23 @@
               <a:rPr lang="en"/>
               <a:t> </a:t>
             </a:r>
+            <a:endParaRPr/>
           </a:p>
           <a:p>
             <a:pPr marL="0" lvl="0" indent="0" rtl="0">
               <a:spcBef>
-                <a:spcPts val="0"/>
-              </a:spcBef>
+                <a:spcPts val="1600"/>
+              </a:spcBef>
+              <a:spcAft>
+                <a:spcPts val="1600"/>
+              </a:spcAft>
               <a:buNone/>
             </a:pPr>
             <a:r>
               <a:rPr lang="en"/>
               <a:t>Community membership $40/month</a:t>
             </a:r>
+            <a:endParaRPr/>
           </a:p>
         </p:txBody>
       </p:sp>
@@ -8384,12 +9170,16 @@
               <a:spcBef>
                 <a:spcPts val="0"/>
               </a:spcBef>
+              <a:spcAft>
+                <a:spcPts val="0"/>
+              </a:spcAft>
               <a:buNone/>
             </a:pPr>
             <a:r>
               <a:rPr lang="en"/>
               <a:t>Twitch.tv/Techlahoma</a:t>
             </a:r>
+            <a:endParaRPr/>
           </a:p>
         </p:txBody>
       </p:sp>
@@ -8422,24 +9212,48 @@
               <a:spcBef>
                 <a:spcPts val="0"/>
               </a:spcBef>
+              <a:spcAft>
+                <a:spcPts val="0"/>
+              </a:spcAft>
+              <a:buNone/>
+            </a:pPr>
+            <a:r>
+              <a:rPr lang="en"/>
+              <a:t>Live streaming at StarSpace46</a:t>
+            </a:r>
+            <a:endParaRPr/>
+          </a:p>
+          <a:p>
+            <a:pPr marL="0" lvl="0" indent="0">
+              <a:spcBef>
+                <a:spcPts val="1600"/>
+              </a:spcBef>
+              <a:spcAft>
+                <a:spcPts val="0"/>
+              </a:spcAft>
               <a:buNone/>
             </a:pPr>
             <a:r>
               <a:rPr lang="en"/>
               <a:t>Subscribe with Amazon Prime</a:t>
             </a:r>
+            <a:endParaRPr/>
           </a:p>
           <a:p>
             <a:pPr marL="0" lvl="0" indent="0" rtl="0">
               <a:spcBef>
-                <a:spcPts val="0"/>
-              </a:spcBef>
+                <a:spcPts val="1600"/>
+              </a:spcBef>
+              <a:spcAft>
+                <a:spcPts val="1600"/>
+              </a:spcAft>
               <a:buNone/>
             </a:pPr>
             <a:r>
               <a:rPr lang="en"/>
               <a:t>Techlahoma gets a small donation from Amazon</a:t>
             </a:r>
+            <a:endParaRPr/>
           </a:p>
         </p:txBody>
       </p:sp>
@@ -8505,12 +9319,16 @@
               <a:spcBef>
                 <a:spcPts val="0"/>
               </a:spcBef>
+              <a:spcAft>
+                <a:spcPts val="0"/>
+              </a:spcAft>
               <a:buNone/>
             </a:pPr>
             <a:r>
               <a:rPr lang="en"/>
               <a:t>Slack</a:t>
             </a:r>
+            <a:endParaRPr/>
           </a:p>
         </p:txBody>
       </p:sp>
@@ -8543,10 +9361,13 @@
               <a:spcBef>
                 <a:spcPts val="0"/>
               </a:spcBef>
+              <a:spcAft>
+                <a:spcPts val="0"/>
+              </a:spcAft>
               <a:buNone/>
             </a:pPr>
             <a:r>
-              <a:rPr lang="en" u="sng">
+              <a:rPr lang="en" sz="4800" u="sng">
                 <a:solidFill>
                   <a:schemeClr val="hlink"/>
                 </a:solidFill>
@@ -8555,21 +9376,26 @@
               <a:t>techlahoma.org/spaces</a:t>
             </a:r>
             <a:r>
-              <a:rPr lang="en"/>
+              <a:rPr lang="en" sz="4800"/>
               <a:t> </a:t>
             </a:r>
+            <a:endParaRPr sz="4800"/>
           </a:p>
           <a:p>
             <a:pPr marL="0" lvl="0" indent="0" rtl="0">
               <a:spcBef>
-                <a:spcPts val="0"/>
-              </a:spcBef>
+                <a:spcPts val="1600"/>
+              </a:spcBef>
+              <a:spcAft>
+                <a:spcPts val="1600"/>
+              </a:spcAft>
               <a:buNone/>
             </a:pPr>
             <a:r>
-              <a:rPr lang="en"/>
+              <a:rPr lang="en" sz="4800"/>
               <a:t>#pythonista channel</a:t>
             </a:r>
+            <a:endParaRPr sz="4800"/>
           </a:p>
         </p:txBody>
       </p:sp>

</xml_diff>